<commit_message>
Version 3 Powerpont Update
-Add Project Root to Install Location
-Change Details
-Added Filter Settings file in "Project Root"
</commit_message>
<xml_diff>
--- a/Revit Addin/Overview/RevitVersionLog.pptx
+++ b/Revit Addin/Overview/RevitVersionLog.pptx
@@ -12,6 +12,9 @@
     <p:sldId id="258" r:id="rId6"/>
     <p:sldId id="263" r:id="rId7"/>
     <p:sldId id="260" r:id="rId8"/>
+    <p:sldId id="266" r:id="rId9"/>
+    <p:sldId id="264" r:id="rId10"/>
+    <p:sldId id="267" r:id="rId11"/>
   </p:sldIdLst>
   <p:sldSz cx="12192000" cy="6858000"/>
   <p:notesSz cx="6858000" cy="9144000"/>
@@ -265,7 +268,7 @@
           <a:p>
             <a:fld id="{433F0E7F-525C-41FC-9C9A-E6C366959C13}" type="datetimeFigureOut">
               <a:rPr lang="en-US" smtClean="0"/>
-              <a:t>4/12/2022</a:t>
+              <a:t>7/18/2022</a:t>
             </a:fld>
             <a:endParaRPr lang="en-US"/>
           </a:p>
@@ -463,7 +466,7 @@
           <a:p>
             <a:fld id="{433F0E7F-525C-41FC-9C9A-E6C366959C13}" type="datetimeFigureOut">
               <a:rPr lang="en-US" smtClean="0"/>
-              <a:t>4/12/2022</a:t>
+              <a:t>7/18/2022</a:t>
             </a:fld>
             <a:endParaRPr lang="en-US"/>
           </a:p>
@@ -671,7 +674,7 @@
           <a:p>
             <a:fld id="{433F0E7F-525C-41FC-9C9A-E6C366959C13}" type="datetimeFigureOut">
               <a:rPr lang="en-US" smtClean="0"/>
-              <a:t>4/12/2022</a:t>
+              <a:t>7/18/2022</a:t>
             </a:fld>
             <a:endParaRPr lang="en-US"/>
           </a:p>
@@ -869,7 +872,7 @@
           <a:p>
             <a:fld id="{433F0E7F-525C-41FC-9C9A-E6C366959C13}" type="datetimeFigureOut">
               <a:rPr lang="en-US" smtClean="0"/>
-              <a:t>4/12/2022</a:t>
+              <a:t>7/18/2022</a:t>
             </a:fld>
             <a:endParaRPr lang="en-US"/>
           </a:p>
@@ -1144,7 +1147,7 @@
           <a:p>
             <a:fld id="{433F0E7F-525C-41FC-9C9A-E6C366959C13}" type="datetimeFigureOut">
               <a:rPr lang="en-US" smtClean="0"/>
-              <a:t>4/12/2022</a:t>
+              <a:t>7/18/2022</a:t>
             </a:fld>
             <a:endParaRPr lang="en-US"/>
           </a:p>
@@ -1409,7 +1412,7 @@
           <a:p>
             <a:fld id="{433F0E7F-525C-41FC-9C9A-E6C366959C13}" type="datetimeFigureOut">
               <a:rPr lang="en-US" smtClean="0"/>
-              <a:t>4/12/2022</a:t>
+              <a:t>7/18/2022</a:t>
             </a:fld>
             <a:endParaRPr lang="en-US"/>
           </a:p>
@@ -1821,7 +1824,7 @@
           <a:p>
             <a:fld id="{433F0E7F-525C-41FC-9C9A-E6C366959C13}" type="datetimeFigureOut">
               <a:rPr lang="en-US" smtClean="0"/>
-              <a:t>4/12/2022</a:t>
+              <a:t>7/18/2022</a:t>
             </a:fld>
             <a:endParaRPr lang="en-US"/>
           </a:p>
@@ -1962,7 +1965,7 @@
           <a:p>
             <a:fld id="{433F0E7F-525C-41FC-9C9A-E6C366959C13}" type="datetimeFigureOut">
               <a:rPr lang="en-US" smtClean="0"/>
-              <a:t>4/12/2022</a:t>
+              <a:t>7/18/2022</a:t>
             </a:fld>
             <a:endParaRPr lang="en-US"/>
           </a:p>
@@ -2075,7 +2078,7 @@
           <a:p>
             <a:fld id="{433F0E7F-525C-41FC-9C9A-E6C366959C13}" type="datetimeFigureOut">
               <a:rPr lang="en-US" smtClean="0"/>
-              <a:t>4/12/2022</a:t>
+              <a:t>7/18/2022</a:t>
             </a:fld>
             <a:endParaRPr lang="en-US"/>
           </a:p>
@@ -2386,7 +2389,7 @@
           <a:p>
             <a:fld id="{433F0E7F-525C-41FC-9C9A-E6C366959C13}" type="datetimeFigureOut">
               <a:rPr lang="en-US" smtClean="0"/>
-              <a:t>4/12/2022</a:t>
+              <a:t>7/18/2022</a:t>
             </a:fld>
             <a:endParaRPr lang="en-US"/>
           </a:p>
@@ -2674,7 +2677,7 @@
           <a:p>
             <a:fld id="{433F0E7F-525C-41FC-9C9A-E6C366959C13}" type="datetimeFigureOut">
               <a:rPr lang="en-US" smtClean="0"/>
-              <a:t>4/12/2022</a:t>
+              <a:t>7/18/2022</a:t>
             </a:fld>
             <a:endParaRPr lang="en-US"/>
           </a:p>
@@ -2915,7 +2918,7 @@
           <a:p>
             <a:fld id="{433F0E7F-525C-41FC-9C9A-E6C366959C13}" type="datetimeFigureOut">
               <a:rPr lang="en-US" smtClean="0"/>
-              <a:t>4/12/2022</a:t>
+              <a:t>7/18/2022</a:t>
             </a:fld>
             <a:endParaRPr lang="en-US"/>
           </a:p>
@@ -3421,6 +3424,324 @@
     <p:extLst>
       <p:ext uri="{BB962C8B-B14F-4D97-AF65-F5344CB8AC3E}">
         <p14:creationId xmlns:p14="http://schemas.microsoft.com/office/powerpoint/2010/main" val="1933294668"/>
+      </p:ext>
+    </p:extLst>
+  </p:cSld>
+  <p:clrMapOvr>
+    <a:masterClrMapping/>
+  </p:clrMapOvr>
+</p:sld>
+</file>
+
+<file path=ppt/slides/slide10.xml><?xml version="1.0" encoding="utf-8"?>
+<p:sld xmlns:a="http://schemas.openxmlformats.org/drawingml/2006/main" xmlns:r="http://schemas.openxmlformats.org/officeDocument/2006/relationships" xmlns:p="http://schemas.openxmlformats.org/presentationml/2006/main">
+  <p:cSld>
+    <p:spTree>
+      <p:nvGrpSpPr>
+        <p:cNvPr id="1" name=""/>
+        <p:cNvGrpSpPr/>
+        <p:nvPr/>
+      </p:nvGrpSpPr>
+      <p:grpSpPr>
+        <a:xfrm>
+          <a:off x="0" y="0"/>
+          <a:ext cx="0" cy="0"/>
+          <a:chOff x="0" y="0"/>
+          <a:chExt cx="0" cy="0"/>
+        </a:xfrm>
+      </p:grpSpPr>
+      <p:sp>
+        <p:nvSpPr>
+          <p:cNvPr id="2" name="Title 1">
+            <a:extLst>
+              <a:ext uri="{FF2B5EF4-FFF2-40B4-BE49-F238E27FC236}">
+                <a16:creationId xmlns:a16="http://schemas.microsoft.com/office/drawing/2014/main" id="{55E1B633-F691-153D-5C47-A99FFA8B82BD}"/>
+              </a:ext>
+            </a:extLst>
+          </p:cNvPr>
+          <p:cNvSpPr>
+            <a:spLocks noGrp="1"/>
+          </p:cNvSpPr>
+          <p:nvPr>
+            <p:ph type="title"/>
+          </p:nvPr>
+        </p:nvSpPr>
+        <p:spPr/>
+        <p:txBody>
+          <a:bodyPr/>
+          <a:lstStyle/>
+          <a:p>
+            <a:r>
+              <a:rPr lang="en-US" dirty="0"/>
+              <a:t>Log Filter</a:t>
+            </a:r>
+          </a:p>
+        </p:txBody>
+      </p:sp>
+      <p:sp>
+        <p:nvSpPr>
+          <p:cNvPr id="3" name="TextBox 2">
+            <a:extLst>
+              <a:ext uri="{FF2B5EF4-FFF2-40B4-BE49-F238E27FC236}">
+                <a16:creationId xmlns:a16="http://schemas.microsoft.com/office/drawing/2014/main" id="{A1542DEC-F465-D135-9704-FCA474F3F011}"/>
+              </a:ext>
+            </a:extLst>
+          </p:cNvPr>
+          <p:cNvSpPr txBox="1"/>
+          <p:nvPr/>
+        </p:nvSpPr>
+        <p:spPr>
+          <a:xfrm>
+            <a:off x="918666" y="1508760"/>
+            <a:ext cx="8964474" cy="7294305"/>
+          </a:xfrm>
+          <a:prstGeom prst="rect">
+            <a:avLst/>
+          </a:prstGeom>
+          <a:noFill/>
+        </p:spPr>
+        <p:txBody>
+          <a:bodyPr wrap="square" rtlCol="0">
+            <a:spAutoFit/>
+          </a:bodyPr>
+          <a:lstStyle/>
+          <a:p>
+            <a:r>
+              <a:rPr lang="en-US" dirty="0"/>
+              <a:t>6. “Log Filter Settings” File</a:t>
+            </a:r>
+          </a:p>
+          <a:p>
+            <a:r>
+              <a:rPr lang="en-US" dirty="0"/>
+              <a:t>Create a Text file in the Project Folder under …/</a:t>
+            </a:r>
+            <a:r>
+              <a:rPr lang="en-US" i="1" dirty="0" err="1"/>
+              <a:t>ProjectRoot</a:t>
+            </a:r>
+            <a:r>
+              <a:rPr lang="en-US" dirty="0"/>
+              <a:t>/</a:t>
+            </a:r>
+            <a:r>
+              <a:rPr lang="en-US" i="1" dirty="0"/>
+              <a:t>Project</a:t>
+            </a:r>
+            <a:r>
+              <a:rPr lang="en-US" dirty="0"/>
+              <a:t>/</a:t>
+            </a:r>
+            <a:r>
+              <a:rPr lang="en-US" dirty="0" err="1">
+                <a:solidFill>
+                  <a:srgbClr val="FF0000"/>
+                </a:solidFill>
+              </a:rPr>
+              <a:t>logsettings</a:t>
+            </a:r>
+            <a:endParaRPr lang="en-US" dirty="0">
+              <a:solidFill>
+                <a:srgbClr val="FF0000"/>
+              </a:solidFill>
+            </a:endParaRPr>
+          </a:p>
+          <a:p>
+            <a:pPr marL="285750" indent="-285750">
+              <a:buFont typeface="Arial" panose="020B0604020202020204" pitchFamily="34" charset="0"/>
+              <a:buChar char="•"/>
+            </a:pPr>
+            <a:r>
+              <a:rPr lang="en-US" i="1" dirty="0"/>
+              <a:t>This file should be read at Log Export time to determine items to be exported</a:t>
+            </a:r>
+          </a:p>
+          <a:p>
+            <a:pPr marL="285750" indent="-285750">
+              <a:buFont typeface="Arial" panose="020B0604020202020204" pitchFamily="34" charset="0"/>
+              <a:buChar char="•"/>
+            </a:pPr>
+            <a:r>
+              <a:rPr lang="en-US" i="1" dirty="0"/>
+              <a:t>The options should include;</a:t>
+            </a:r>
+          </a:p>
+          <a:p>
+            <a:pPr marL="285750" indent="-285750">
+              <a:buFont typeface="Arial" panose="020B0604020202020204" pitchFamily="34" charset="0"/>
+              <a:buChar char="•"/>
+            </a:pPr>
+            <a:endParaRPr lang="en-US" i="1" dirty="0"/>
+          </a:p>
+          <a:p>
+            <a:pPr marL="285750" indent="-285750">
+              <a:buFont typeface="Arial" panose="020B0604020202020204" pitchFamily="34" charset="0"/>
+              <a:buChar char="•"/>
+            </a:pPr>
+            <a:r>
+              <a:rPr lang="en-US" i="1" dirty="0"/>
+              <a:t>Model Categories (yes/no)</a:t>
+            </a:r>
+          </a:p>
+          <a:p>
+            <a:pPr marL="285750" indent="-285750">
+              <a:buFont typeface="Arial" panose="020B0604020202020204" pitchFamily="34" charset="0"/>
+              <a:buChar char="•"/>
+            </a:pPr>
+            <a:r>
+              <a:rPr lang="en-US" i="1" dirty="0"/>
+              <a:t>Annotation Categories (yes/no)</a:t>
+            </a:r>
+          </a:p>
+          <a:p>
+            <a:pPr marL="285750" indent="-285750">
+              <a:buFont typeface="Arial" panose="020B0604020202020204" pitchFamily="34" charset="0"/>
+              <a:buChar char="•"/>
+            </a:pPr>
+            <a:r>
+              <a:rPr lang="en-US" i="1" dirty="0"/>
+              <a:t>Views (yes/no) </a:t>
+            </a:r>
+          </a:p>
+          <a:p>
+            <a:pPr marL="742950" lvl="1" indent="-285750">
+              <a:buFont typeface="Arial" panose="020B0604020202020204" pitchFamily="34" charset="0"/>
+              <a:buChar char="•"/>
+            </a:pPr>
+            <a:r>
+              <a:rPr lang="en-US" i="1" dirty="0"/>
+              <a:t>Schedules (yes/no)</a:t>
+            </a:r>
+          </a:p>
+          <a:p>
+            <a:pPr marL="742950" lvl="1" indent="-285750">
+              <a:buFont typeface="Arial" panose="020B0604020202020204" pitchFamily="34" charset="0"/>
+              <a:buChar char="•"/>
+            </a:pPr>
+            <a:r>
+              <a:rPr lang="en-US" i="1" dirty="0"/>
+              <a:t>Details (yes/no)</a:t>
+            </a:r>
+          </a:p>
+          <a:p>
+            <a:pPr marL="742950" lvl="1" indent="-285750">
+              <a:buFont typeface="Arial" panose="020B0604020202020204" pitchFamily="34" charset="0"/>
+              <a:buChar char="•"/>
+            </a:pPr>
+            <a:r>
+              <a:rPr lang="en-US" i="1" dirty="0"/>
+              <a:t>Sheets (yes/no)</a:t>
+            </a:r>
+          </a:p>
+          <a:p>
+            <a:pPr marL="742950" lvl="1" indent="-285750">
+              <a:buFont typeface="Arial" panose="020B0604020202020204" pitchFamily="34" charset="0"/>
+              <a:buChar char="•"/>
+            </a:pPr>
+            <a:r>
+              <a:rPr lang="en-US" i="1" dirty="0"/>
+              <a:t>Model Views (yes/no)</a:t>
+            </a:r>
+          </a:p>
+          <a:p>
+            <a:pPr marL="742950" lvl="1" indent="-285750">
+              <a:buFont typeface="Arial" panose="020B0604020202020204" pitchFamily="34" charset="0"/>
+              <a:buChar char="•"/>
+            </a:pPr>
+            <a:r>
+              <a:rPr lang="en-US" i="1" dirty="0"/>
+              <a:t>Legends (yes/no)</a:t>
+            </a:r>
+          </a:p>
+          <a:p>
+            <a:pPr marL="285750" indent="-285750">
+              <a:buFont typeface="Arial" panose="020B0604020202020204" pitchFamily="34" charset="0"/>
+              <a:buChar char="•"/>
+            </a:pPr>
+            <a:r>
+              <a:rPr lang="en-US" i="1" dirty="0"/>
+              <a:t>Family Types (yes/no)</a:t>
+            </a:r>
+          </a:p>
+          <a:p>
+            <a:pPr marL="285750" indent="-285750">
+              <a:buFont typeface="Arial" panose="020B0604020202020204" pitchFamily="34" charset="0"/>
+              <a:buChar char="•"/>
+            </a:pPr>
+            <a:r>
+              <a:rPr lang="en-US" i="1" dirty="0"/>
+              <a:t>Links (yes/no)</a:t>
+            </a:r>
+          </a:p>
+          <a:p>
+            <a:pPr marL="285750" indent="-285750">
+              <a:buFont typeface="Arial" panose="020B0604020202020204" pitchFamily="34" charset="0"/>
+              <a:buChar char="•"/>
+            </a:pPr>
+            <a:r>
+              <a:rPr lang="en-US" i="1" dirty="0"/>
+              <a:t>Imported Categories (yes/no)</a:t>
+            </a:r>
+          </a:p>
+          <a:p>
+            <a:pPr marL="285750" indent="-285750">
+              <a:buFont typeface="Arial" panose="020B0604020202020204" pitchFamily="34" charset="0"/>
+              <a:buChar char="•"/>
+            </a:pPr>
+            <a:r>
+              <a:rPr lang="en-US" i="1" dirty="0"/>
+              <a:t>Other?</a:t>
+            </a:r>
+          </a:p>
+          <a:p>
+            <a:r>
+              <a:rPr lang="en-US" i="1" dirty="0">
+                <a:solidFill>
+                  <a:srgbClr val="FF0000"/>
+                </a:solidFill>
+              </a:rPr>
+              <a:t>The goal should be that if only model categories are set to yes, that the only changes that are exporter to the log are “Placed Instances in the host file of 3D elements)”</a:t>
+            </a:r>
+          </a:p>
+          <a:p>
+            <a:pPr marL="285750" indent="-285750">
+              <a:buFont typeface="Arial" panose="020B0604020202020204" pitchFamily="34" charset="0"/>
+              <a:buChar char="•"/>
+            </a:pPr>
+            <a:endParaRPr lang="en-US" i="1" dirty="0"/>
+          </a:p>
+          <a:p>
+            <a:pPr marL="285750" indent="-285750">
+              <a:buFont typeface="Arial" panose="020B0604020202020204" pitchFamily="34" charset="0"/>
+              <a:buChar char="•"/>
+            </a:pPr>
+            <a:endParaRPr lang="en-US" i="1" dirty="0"/>
+          </a:p>
+          <a:p>
+            <a:pPr marL="285750" indent="-285750">
+              <a:buFont typeface="Arial" panose="020B0604020202020204" pitchFamily="34" charset="0"/>
+              <a:buChar char="•"/>
+            </a:pPr>
+            <a:endParaRPr lang="en-US" i="1" dirty="0"/>
+          </a:p>
+          <a:p>
+            <a:endParaRPr lang="en-US" dirty="0"/>
+          </a:p>
+          <a:p>
+            <a:endParaRPr lang="en-US" dirty="0"/>
+          </a:p>
+          <a:p>
+            <a:endParaRPr lang="en-US" dirty="0"/>
+          </a:p>
+          <a:p>
+            <a:endParaRPr lang="en-US" dirty="0"/>
+          </a:p>
+        </p:txBody>
+      </p:sp>
+    </p:spTree>
+    <p:extLst>
+      <p:ext uri="{BB962C8B-B14F-4D97-AF65-F5344CB8AC3E}">
+        <p14:creationId xmlns:p14="http://schemas.microsoft.com/office/powerpoint/2010/main" val="663227087"/>
       </p:ext>
     </p:extLst>
   </p:cSld>
@@ -7929,6 +8250,3908 @@
 </p:sld>
 </file>
 
+<file path=ppt/slides/slide8.xml><?xml version="1.0" encoding="utf-8"?>
+<p:sld xmlns:a="http://schemas.openxmlformats.org/drawingml/2006/main" xmlns:r="http://schemas.openxmlformats.org/officeDocument/2006/relationships" xmlns:p="http://schemas.openxmlformats.org/presentationml/2006/main">
+  <p:cSld>
+    <p:spTree>
+      <p:nvGrpSpPr>
+        <p:cNvPr id="1" name=""/>
+        <p:cNvGrpSpPr/>
+        <p:nvPr/>
+      </p:nvGrpSpPr>
+      <p:grpSpPr>
+        <a:xfrm>
+          <a:off x="0" y="0"/>
+          <a:ext cx="0" cy="0"/>
+          <a:chOff x="0" y="0"/>
+          <a:chExt cx="0" cy="0"/>
+        </a:xfrm>
+      </p:grpSpPr>
+      <p:sp>
+        <p:nvSpPr>
+          <p:cNvPr id="2" name="Title 1">
+            <a:extLst>
+              <a:ext uri="{FF2B5EF4-FFF2-40B4-BE49-F238E27FC236}">
+                <a16:creationId xmlns:a16="http://schemas.microsoft.com/office/drawing/2014/main" id="{653901F3-B390-332B-B7BD-490FCE3D7B64}"/>
+              </a:ext>
+            </a:extLst>
+          </p:cNvPr>
+          <p:cNvSpPr>
+            <a:spLocks noGrp="1"/>
+          </p:cNvSpPr>
+          <p:nvPr>
+            <p:ph type="title"/>
+          </p:nvPr>
+        </p:nvSpPr>
+        <p:spPr/>
+        <p:txBody>
+          <a:bodyPr/>
+          <a:lstStyle/>
+          <a:p>
+            <a:r>
+              <a:rPr lang="en-US" dirty="0"/>
+              <a:t>Revision #3</a:t>
+            </a:r>
+          </a:p>
+        </p:txBody>
+      </p:sp>
+      <p:sp>
+        <p:nvSpPr>
+          <p:cNvPr id="3" name="Text Placeholder 2">
+            <a:extLst>
+              <a:ext uri="{FF2B5EF4-FFF2-40B4-BE49-F238E27FC236}">
+                <a16:creationId xmlns:a16="http://schemas.microsoft.com/office/drawing/2014/main" id="{4550C503-26D4-6DBD-AE36-98362F346900}"/>
+              </a:ext>
+            </a:extLst>
+          </p:cNvPr>
+          <p:cNvSpPr>
+            <a:spLocks noGrp="1"/>
+          </p:cNvSpPr>
+          <p:nvPr>
+            <p:ph type="body" idx="1"/>
+          </p:nvPr>
+        </p:nvSpPr>
+        <p:spPr/>
+        <p:txBody>
+          <a:bodyPr/>
+          <a:lstStyle/>
+          <a:p>
+            <a:endParaRPr lang="en-US"/>
+          </a:p>
+        </p:txBody>
+      </p:sp>
+    </p:spTree>
+    <p:extLst>
+      <p:ext uri="{BB962C8B-B14F-4D97-AF65-F5344CB8AC3E}">
+        <p14:creationId xmlns:p14="http://schemas.microsoft.com/office/powerpoint/2010/main" val="1479874361"/>
+      </p:ext>
+    </p:extLst>
+  </p:cSld>
+  <p:clrMapOvr>
+    <a:masterClrMapping/>
+  </p:clrMapOvr>
+</p:sld>
+</file>
+
+<file path=ppt/slides/slide9.xml><?xml version="1.0" encoding="utf-8"?>
+<p:sld xmlns:a="http://schemas.openxmlformats.org/drawingml/2006/main" xmlns:r="http://schemas.openxmlformats.org/officeDocument/2006/relationships" xmlns:p="http://schemas.openxmlformats.org/presentationml/2006/main">
+  <p:cSld>
+    <p:spTree>
+      <p:nvGrpSpPr>
+        <p:cNvPr id="1" name=""/>
+        <p:cNvGrpSpPr/>
+        <p:nvPr/>
+      </p:nvGrpSpPr>
+      <p:grpSpPr>
+        <a:xfrm>
+          <a:off x="0" y="0"/>
+          <a:ext cx="0" cy="0"/>
+          <a:chOff x="0" y="0"/>
+          <a:chExt cx="0" cy="0"/>
+        </a:xfrm>
+      </p:grpSpPr>
+      <p:sp>
+        <p:nvSpPr>
+          <p:cNvPr id="2" name="Title 1">
+            <a:extLst>
+              <a:ext uri="{FF2B5EF4-FFF2-40B4-BE49-F238E27FC236}">
+                <a16:creationId xmlns:a16="http://schemas.microsoft.com/office/drawing/2014/main" id="{CD065910-18B6-4658-A834-36CC972A571A}"/>
+              </a:ext>
+            </a:extLst>
+          </p:cNvPr>
+          <p:cNvSpPr>
+            <a:spLocks noGrp="1"/>
+          </p:cNvSpPr>
+          <p:nvPr>
+            <p:ph type="title"/>
+          </p:nvPr>
+        </p:nvSpPr>
+        <p:spPr/>
+        <p:txBody>
+          <a:bodyPr/>
+          <a:lstStyle/>
+          <a:p>
+            <a:endParaRPr lang="en-US"/>
+          </a:p>
+        </p:txBody>
+      </p:sp>
+      <p:pic>
+        <p:nvPicPr>
+          <p:cNvPr id="4" name="Picture 3">
+            <a:extLst>
+              <a:ext uri="{FF2B5EF4-FFF2-40B4-BE49-F238E27FC236}">
+                <a16:creationId xmlns:a16="http://schemas.microsoft.com/office/drawing/2014/main" id="{CFF8B2DE-B38F-440F-BC3B-49AA981B3FA5}"/>
+              </a:ext>
+            </a:extLst>
+          </p:cNvPr>
+          <p:cNvPicPr>
+            <a:picLocks noChangeAspect="1"/>
+          </p:cNvPicPr>
+          <p:nvPr/>
+        </p:nvPicPr>
+        <p:blipFill>
+          <a:blip r:embed="rId2"/>
+          <a:stretch>
+            <a:fillRect/>
+          </a:stretch>
+        </p:blipFill>
+        <p:spPr>
+          <a:xfrm>
+            <a:off x="-14915" y="0"/>
+            <a:ext cx="12192000" cy="6858000"/>
+          </a:xfrm>
+          <a:prstGeom prst="rect">
+            <a:avLst/>
+          </a:prstGeom>
+        </p:spPr>
+      </p:pic>
+      <p:sp>
+        <p:nvSpPr>
+          <p:cNvPr id="6" name="Rectangle 5">
+            <a:extLst>
+              <a:ext uri="{FF2B5EF4-FFF2-40B4-BE49-F238E27FC236}">
+                <a16:creationId xmlns:a16="http://schemas.microsoft.com/office/drawing/2014/main" id="{DD753CCA-A1A2-4DDD-9EED-2EE948281EA9}"/>
+              </a:ext>
+            </a:extLst>
+          </p:cNvPr>
+          <p:cNvSpPr/>
+          <p:nvPr/>
+        </p:nvSpPr>
+        <p:spPr>
+          <a:xfrm>
+            <a:off x="278297" y="219075"/>
+            <a:ext cx="5910548" cy="461963"/>
+          </a:xfrm>
+          <a:prstGeom prst="rect">
+            <a:avLst/>
+          </a:prstGeom>
+          <a:solidFill>
+            <a:srgbClr val="EEEEEE"/>
+          </a:solidFill>
+          <a:ln>
+            <a:noFill/>
+          </a:ln>
+        </p:spPr>
+        <p:style>
+          <a:lnRef idx="2">
+            <a:schemeClr val="accent1">
+              <a:shade val="50000"/>
+            </a:schemeClr>
+          </a:lnRef>
+          <a:fillRef idx="1">
+            <a:schemeClr val="accent1"/>
+          </a:fillRef>
+          <a:effectRef idx="0">
+            <a:schemeClr val="accent1"/>
+          </a:effectRef>
+          <a:fontRef idx="minor">
+            <a:schemeClr val="lt1"/>
+          </a:fontRef>
+        </p:style>
+        <p:txBody>
+          <a:bodyPr rtlCol="0" anchor="ctr"/>
+          <a:lstStyle/>
+          <a:p>
+            <a:pPr algn="ctr"/>
+            <a:endParaRPr lang="en-US"/>
+          </a:p>
+        </p:txBody>
+      </p:sp>
+      <p:sp>
+        <p:nvSpPr>
+          <p:cNvPr id="60" name="TextBox 59">
+            <a:extLst>
+              <a:ext uri="{FF2B5EF4-FFF2-40B4-BE49-F238E27FC236}">
+                <a16:creationId xmlns:a16="http://schemas.microsoft.com/office/drawing/2014/main" id="{8AFFFC91-419B-4D06-90E5-98D3E50113F8}"/>
+              </a:ext>
+            </a:extLst>
+          </p:cNvPr>
+          <p:cNvSpPr txBox="1"/>
+          <p:nvPr/>
+        </p:nvSpPr>
+        <p:spPr>
+          <a:xfrm>
+            <a:off x="5605495" y="1202898"/>
+            <a:ext cx="1322784" cy="200055"/>
+          </a:xfrm>
+          <a:prstGeom prst="rect">
+            <a:avLst/>
+          </a:prstGeom>
+          <a:noFill/>
+        </p:spPr>
+        <p:txBody>
+          <a:bodyPr wrap="square" rtlCol="0">
+            <a:spAutoFit/>
+          </a:bodyPr>
+          <a:lstStyle/>
+          <a:p>
+            <a:r>
+              <a:rPr lang="en-US" sz="700" u="sng" dirty="0">
+                <a:solidFill>
+                  <a:schemeClr val="bg1">
+                    <a:lumMod val="50000"/>
+                  </a:schemeClr>
+                </a:solidFill>
+                <a:latin typeface="Arial" panose="020B0604020202020204" pitchFamily="34" charset="0"/>
+                <a:cs typeface="Arial" panose="020B0604020202020204" pitchFamily="34" charset="0"/>
+              </a:rPr>
+              <a:t>Demo</a:t>
+            </a:r>
+          </a:p>
+        </p:txBody>
+      </p:sp>
+      <p:sp>
+        <p:nvSpPr>
+          <p:cNvPr id="107" name="TextBox 106">
+            <a:extLst>
+              <a:ext uri="{FF2B5EF4-FFF2-40B4-BE49-F238E27FC236}">
+                <a16:creationId xmlns:a16="http://schemas.microsoft.com/office/drawing/2014/main" id="{655B20D5-BB0D-4420-8308-00D0A9FE9E3C}"/>
+              </a:ext>
+            </a:extLst>
+          </p:cNvPr>
+          <p:cNvSpPr txBox="1"/>
+          <p:nvPr/>
+        </p:nvSpPr>
+        <p:spPr>
+          <a:xfrm>
+            <a:off x="9726278" y="1202898"/>
+            <a:ext cx="1322784" cy="200055"/>
+          </a:xfrm>
+          <a:prstGeom prst="rect">
+            <a:avLst/>
+          </a:prstGeom>
+          <a:noFill/>
+        </p:spPr>
+        <p:txBody>
+          <a:bodyPr wrap="square" rtlCol="0">
+            <a:spAutoFit/>
+          </a:bodyPr>
+          <a:lstStyle/>
+          <a:p>
+            <a:r>
+              <a:rPr lang="en-US" sz="700" u="sng" dirty="0">
+                <a:solidFill>
+                  <a:schemeClr val="bg1">
+                    <a:lumMod val="50000"/>
+                  </a:schemeClr>
+                </a:solidFill>
+                <a:latin typeface="Arial" panose="020B0604020202020204" pitchFamily="34" charset="0"/>
+                <a:cs typeface="Arial" panose="020B0604020202020204" pitchFamily="34" charset="0"/>
+              </a:rPr>
+              <a:t>Demo</a:t>
+            </a:r>
+          </a:p>
+        </p:txBody>
+      </p:sp>
+      <p:grpSp>
+        <p:nvGrpSpPr>
+          <p:cNvPr id="95" name="Group 94">
+            <a:extLst>
+              <a:ext uri="{FF2B5EF4-FFF2-40B4-BE49-F238E27FC236}">
+                <a16:creationId xmlns:a16="http://schemas.microsoft.com/office/drawing/2014/main" id="{1FEDF1FA-ECC4-4E3F-978D-C0135A0AD92B}"/>
+              </a:ext>
+            </a:extLst>
+          </p:cNvPr>
+          <p:cNvGrpSpPr/>
+          <p:nvPr/>
+        </p:nvGrpSpPr>
+        <p:grpSpPr>
+          <a:xfrm>
+            <a:off x="7049920" y="925635"/>
+            <a:ext cx="3160644" cy="1670229"/>
+            <a:chOff x="7049920" y="925635"/>
+            <a:chExt cx="3160644" cy="1670229"/>
+          </a:xfrm>
+        </p:grpSpPr>
+        <p:sp>
+          <p:nvSpPr>
+            <p:cNvPr id="62" name="Rectangle 61">
+              <a:extLst>
+                <a:ext uri="{FF2B5EF4-FFF2-40B4-BE49-F238E27FC236}">
+                  <a16:creationId xmlns:a16="http://schemas.microsoft.com/office/drawing/2014/main" id="{9E4F9567-447A-4751-A157-840367A8E069}"/>
+                </a:ext>
+              </a:extLst>
+            </p:cNvPr>
+            <p:cNvSpPr/>
+            <p:nvPr/>
+          </p:nvSpPr>
+          <p:spPr>
+            <a:xfrm>
+              <a:off x="7049920" y="1064781"/>
+              <a:ext cx="3160644" cy="1531083"/>
+            </a:xfrm>
+            <a:prstGeom prst="rect">
+              <a:avLst/>
+            </a:prstGeom>
+            <a:solidFill>
+              <a:srgbClr val="FFFFFF"/>
+            </a:solidFill>
+            <a:ln>
+              <a:solidFill>
+                <a:srgbClr val="FF307C"/>
+              </a:solidFill>
+            </a:ln>
+          </p:spPr>
+          <p:style>
+            <a:lnRef idx="2">
+              <a:schemeClr val="accent1">
+                <a:shade val="50000"/>
+              </a:schemeClr>
+            </a:lnRef>
+            <a:fillRef idx="1">
+              <a:schemeClr val="accent1"/>
+            </a:fillRef>
+            <a:effectRef idx="0">
+              <a:schemeClr val="accent1"/>
+            </a:effectRef>
+            <a:fontRef idx="minor">
+              <a:schemeClr val="lt1"/>
+            </a:fontRef>
+          </p:style>
+          <p:txBody>
+            <a:bodyPr rtlCol="0" anchor="ctr"/>
+            <a:lstStyle/>
+            <a:p>
+              <a:pPr algn="ctr"/>
+              <a:endParaRPr lang="en-US" dirty="0"/>
+            </a:p>
+          </p:txBody>
+        </p:sp>
+        <p:sp>
+          <p:nvSpPr>
+            <p:cNvPr id="63" name="Rectangle 62">
+              <a:extLst>
+                <a:ext uri="{FF2B5EF4-FFF2-40B4-BE49-F238E27FC236}">
+                  <a16:creationId xmlns:a16="http://schemas.microsoft.com/office/drawing/2014/main" id="{C46CFBAB-270C-483A-B36A-821FE27EEBD8}"/>
+                </a:ext>
+              </a:extLst>
+            </p:cNvPr>
+            <p:cNvSpPr/>
+            <p:nvPr/>
+          </p:nvSpPr>
+          <p:spPr>
+            <a:xfrm>
+              <a:off x="7049920" y="925635"/>
+              <a:ext cx="3160643" cy="139147"/>
+            </a:xfrm>
+            <a:prstGeom prst="rect">
+              <a:avLst/>
+            </a:prstGeom>
+            <a:solidFill>
+              <a:srgbClr val="FF307C"/>
+            </a:solidFill>
+            <a:ln>
+              <a:solidFill>
+                <a:srgbClr val="FF307C"/>
+              </a:solidFill>
+            </a:ln>
+          </p:spPr>
+          <p:style>
+            <a:lnRef idx="2">
+              <a:schemeClr val="accent1">
+                <a:shade val="50000"/>
+              </a:schemeClr>
+            </a:lnRef>
+            <a:fillRef idx="1">
+              <a:schemeClr val="accent1"/>
+            </a:fillRef>
+            <a:effectRef idx="0">
+              <a:schemeClr val="accent1"/>
+            </a:effectRef>
+            <a:fontRef idx="minor">
+              <a:schemeClr val="lt1"/>
+            </a:fontRef>
+          </p:style>
+          <p:txBody>
+            <a:bodyPr rtlCol="0" anchor="ctr"/>
+            <a:lstStyle/>
+            <a:p>
+              <a:r>
+                <a:rPr lang="en-US" sz="700" dirty="0">
+                  <a:latin typeface="Arial" panose="020B0604020202020204" pitchFamily="34" charset="0"/>
+                  <a:cs typeface="Arial" panose="020B0604020202020204" pitchFamily="34" charset="0"/>
+                </a:rPr>
+                <a:t>Revit Logger - Notes</a:t>
+              </a:r>
+            </a:p>
+          </p:txBody>
+        </p:sp>
+        <p:sp>
+          <p:nvSpPr>
+            <p:cNvPr id="65" name="Rectangle: Rounded Corners 64">
+              <a:hlinkClick r:id="" action="ppaction://hlinkshowjump?jump=nextslide"/>
+              <a:extLst>
+                <a:ext uri="{FF2B5EF4-FFF2-40B4-BE49-F238E27FC236}">
+                  <a16:creationId xmlns:a16="http://schemas.microsoft.com/office/drawing/2014/main" id="{CC4E4287-3010-4EA1-B7AE-1E23F8A212A1}"/>
+                </a:ext>
+              </a:extLst>
+            </p:cNvPr>
+            <p:cNvSpPr/>
+            <p:nvPr/>
+          </p:nvSpPr>
+          <p:spPr>
+            <a:xfrm>
+              <a:off x="9524532" y="2316353"/>
+              <a:ext cx="621578" cy="200392"/>
+            </a:xfrm>
+            <a:prstGeom prst="roundRect">
+              <a:avLst/>
+            </a:prstGeom>
+            <a:noFill/>
+            <a:ln>
+              <a:solidFill>
+                <a:srgbClr val="FF522F"/>
+              </a:solidFill>
+            </a:ln>
+          </p:spPr>
+          <p:style>
+            <a:lnRef idx="2">
+              <a:schemeClr val="accent1">
+                <a:shade val="50000"/>
+              </a:schemeClr>
+            </a:lnRef>
+            <a:fillRef idx="1">
+              <a:schemeClr val="accent1"/>
+            </a:fillRef>
+            <a:effectRef idx="0">
+              <a:schemeClr val="accent1"/>
+            </a:effectRef>
+            <a:fontRef idx="minor">
+              <a:schemeClr val="lt1"/>
+            </a:fontRef>
+          </p:style>
+          <p:txBody>
+            <a:bodyPr rtlCol="0" anchor="ctr"/>
+            <a:lstStyle/>
+            <a:p>
+              <a:pPr algn="ctr"/>
+              <a:r>
+                <a:rPr lang="en-US" sz="900" dirty="0">
+                  <a:solidFill>
+                    <a:schemeClr val="tx1"/>
+                  </a:solidFill>
+                </a:rPr>
+                <a:t>Save</a:t>
+              </a:r>
+            </a:p>
+          </p:txBody>
+        </p:sp>
+        <p:sp>
+          <p:nvSpPr>
+            <p:cNvPr id="68" name="Rectangle 67">
+              <a:extLst>
+                <a:ext uri="{FF2B5EF4-FFF2-40B4-BE49-F238E27FC236}">
+                  <a16:creationId xmlns:a16="http://schemas.microsoft.com/office/drawing/2014/main" id="{4D59D39C-904D-4730-977F-D3789B52E4A4}"/>
+                </a:ext>
+              </a:extLst>
+            </p:cNvPr>
+            <p:cNvSpPr/>
+            <p:nvPr/>
+          </p:nvSpPr>
+          <p:spPr>
+            <a:xfrm>
+              <a:off x="7252326" y="1547732"/>
+              <a:ext cx="2471738" cy="139147"/>
+            </a:xfrm>
+            <a:prstGeom prst="rect">
+              <a:avLst/>
+            </a:prstGeom>
+            <a:noFill/>
+            <a:ln>
+              <a:solidFill>
+                <a:srgbClr val="CCCCCC"/>
+              </a:solidFill>
+            </a:ln>
+          </p:spPr>
+          <p:style>
+            <a:lnRef idx="2">
+              <a:schemeClr val="accent1">
+                <a:shade val="50000"/>
+              </a:schemeClr>
+            </a:lnRef>
+            <a:fillRef idx="1">
+              <a:schemeClr val="accent1"/>
+            </a:fillRef>
+            <a:effectRef idx="0">
+              <a:schemeClr val="accent1"/>
+            </a:effectRef>
+            <a:fontRef idx="minor">
+              <a:schemeClr val="lt1"/>
+            </a:fontRef>
+          </p:style>
+          <p:txBody>
+            <a:bodyPr rtlCol="0" anchor="ctr"/>
+            <a:lstStyle/>
+            <a:p>
+              <a:r>
+                <a:rPr lang="en-US" sz="700" i="1" dirty="0">
+                  <a:solidFill>
+                    <a:schemeClr val="bg1">
+                      <a:lumMod val="50000"/>
+                    </a:schemeClr>
+                  </a:solidFill>
+                </a:rPr>
+                <a:t>&lt;enter a user note (optional)&gt;</a:t>
+              </a:r>
+            </a:p>
+          </p:txBody>
+        </p:sp>
+        <p:sp>
+          <p:nvSpPr>
+            <p:cNvPr id="69" name="TextBox 68">
+              <a:extLst>
+                <a:ext uri="{FF2B5EF4-FFF2-40B4-BE49-F238E27FC236}">
+                  <a16:creationId xmlns:a16="http://schemas.microsoft.com/office/drawing/2014/main" id="{DD3A16D0-377B-4EBE-A5FF-82CE69498709}"/>
+                </a:ext>
+              </a:extLst>
+            </p:cNvPr>
+            <p:cNvSpPr txBox="1"/>
+            <p:nvPr/>
+          </p:nvSpPr>
+          <p:spPr>
+            <a:xfrm>
+              <a:off x="7150529" y="1378648"/>
+              <a:ext cx="1322784" cy="200055"/>
+            </a:xfrm>
+            <a:prstGeom prst="rect">
+              <a:avLst/>
+            </a:prstGeom>
+            <a:noFill/>
+          </p:spPr>
+          <p:txBody>
+            <a:bodyPr wrap="square" rtlCol="0">
+              <a:spAutoFit/>
+            </a:bodyPr>
+            <a:lstStyle/>
+            <a:p>
+              <a:r>
+                <a:rPr lang="en-US" sz="700" dirty="0">
+                  <a:latin typeface="Arial" panose="020B0604020202020204" pitchFamily="34" charset="0"/>
+                  <a:cs typeface="Arial" panose="020B0604020202020204" pitchFamily="34" charset="0"/>
+                </a:rPr>
+                <a:t>User Note</a:t>
+              </a:r>
+            </a:p>
+          </p:txBody>
+        </p:sp>
+        <p:sp>
+          <p:nvSpPr>
+            <p:cNvPr id="75" name="Rectangle: Rounded Corners 74">
+              <a:extLst>
+                <a:ext uri="{FF2B5EF4-FFF2-40B4-BE49-F238E27FC236}">
+                  <a16:creationId xmlns:a16="http://schemas.microsoft.com/office/drawing/2014/main" id="{B7C39A2A-C74D-42BF-80A0-6FB55687DA3C}"/>
+                </a:ext>
+              </a:extLst>
+            </p:cNvPr>
+            <p:cNvSpPr/>
+            <p:nvPr/>
+          </p:nvSpPr>
+          <p:spPr>
+            <a:xfrm>
+              <a:off x="7150529" y="1126318"/>
+              <a:ext cx="2999780" cy="1078423"/>
+            </a:xfrm>
+            <a:prstGeom prst="roundRect">
+              <a:avLst>
+                <a:gd name="adj" fmla="val 5201"/>
+              </a:avLst>
+            </a:prstGeom>
+            <a:noFill/>
+            <a:ln>
+              <a:solidFill>
+                <a:srgbClr val="333F50"/>
+              </a:solidFill>
+            </a:ln>
+          </p:spPr>
+          <p:style>
+            <a:lnRef idx="2">
+              <a:schemeClr val="accent1">
+                <a:shade val="50000"/>
+              </a:schemeClr>
+            </a:lnRef>
+            <a:fillRef idx="1">
+              <a:schemeClr val="accent1"/>
+            </a:fillRef>
+            <a:effectRef idx="0">
+              <a:schemeClr val="accent1"/>
+            </a:effectRef>
+            <a:fontRef idx="minor">
+              <a:schemeClr val="lt1"/>
+            </a:fontRef>
+          </p:style>
+          <p:txBody>
+            <a:bodyPr rtlCol="0" anchor="ctr"/>
+            <a:lstStyle/>
+            <a:p>
+              <a:pPr algn="ctr"/>
+              <a:endParaRPr lang="en-US" dirty="0"/>
+            </a:p>
+          </p:txBody>
+        </p:sp>
+        <p:sp>
+          <p:nvSpPr>
+            <p:cNvPr id="77" name="TextBox 76">
+              <a:extLst>
+                <a:ext uri="{FF2B5EF4-FFF2-40B4-BE49-F238E27FC236}">
+                  <a16:creationId xmlns:a16="http://schemas.microsoft.com/office/drawing/2014/main" id="{D3682093-FA16-4B4F-8779-6E435F145A94}"/>
+                </a:ext>
+              </a:extLst>
+            </p:cNvPr>
+            <p:cNvSpPr txBox="1"/>
+            <p:nvPr/>
+          </p:nvSpPr>
+          <p:spPr>
+            <a:xfrm>
+              <a:off x="7161726" y="1202898"/>
+              <a:ext cx="1322784" cy="200055"/>
+            </a:xfrm>
+            <a:prstGeom prst="rect">
+              <a:avLst/>
+            </a:prstGeom>
+            <a:noFill/>
+          </p:spPr>
+          <p:txBody>
+            <a:bodyPr wrap="square" rtlCol="0">
+              <a:spAutoFit/>
+            </a:bodyPr>
+            <a:lstStyle/>
+            <a:p>
+              <a:r>
+                <a:rPr lang="en-US" sz="700" dirty="0">
+                  <a:latin typeface="Arial" panose="020B0604020202020204" pitchFamily="34" charset="0"/>
+                  <a:cs typeface="Arial" panose="020B0604020202020204" pitchFamily="34" charset="0"/>
+                </a:rPr>
+                <a:t>Notes</a:t>
+              </a:r>
+            </a:p>
+          </p:txBody>
+        </p:sp>
+        <p:sp>
+          <p:nvSpPr>
+            <p:cNvPr id="78" name="Rectangle: Rounded Corners 77">
+              <a:hlinkClick r:id="" action="ppaction://hlinkshowjump?jump=nextslide"/>
+              <a:extLst>
+                <a:ext uri="{FF2B5EF4-FFF2-40B4-BE49-F238E27FC236}">
+                  <a16:creationId xmlns:a16="http://schemas.microsoft.com/office/drawing/2014/main" id="{C797E666-0465-4E04-8B8D-0959574C341D}"/>
+                </a:ext>
+              </a:extLst>
+            </p:cNvPr>
+            <p:cNvSpPr/>
+            <p:nvPr/>
+          </p:nvSpPr>
+          <p:spPr>
+            <a:xfrm>
+              <a:off x="8825897" y="2316353"/>
+              <a:ext cx="621578" cy="200392"/>
+            </a:xfrm>
+            <a:prstGeom prst="roundRect">
+              <a:avLst/>
+            </a:prstGeom>
+            <a:noFill/>
+            <a:ln>
+              <a:solidFill>
+                <a:srgbClr val="FF522F"/>
+              </a:solidFill>
+            </a:ln>
+          </p:spPr>
+          <p:style>
+            <a:lnRef idx="2">
+              <a:schemeClr val="accent1">
+                <a:shade val="50000"/>
+              </a:schemeClr>
+            </a:lnRef>
+            <a:fillRef idx="1">
+              <a:schemeClr val="accent1"/>
+            </a:fillRef>
+            <a:effectRef idx="0">
+              <a:schemeClr val="accent1"/>
+            </a:effectRef>
+            <a:fontRef idx="minor">
+              <a:schemeClr val="lt1"/>
+            </a:fontRef>
+          </p:style>
+          <p:txBody>
+            <a:bodyPr rtlCol="0" anchor="ctr"/>
+            <a:lstStyle/>
+            <a:p>
+              <a:pPr algn="ctr"/>
+              <a:r>
+                <a:rPr lang="en-US" sz="900" dirty="0">
+                  <a:solidFill>
+                    <a:schemeClr val="tx1"/>
+                  </a:solidFill>
+                </a:rPr>
+                <a:t>Cancel</a:t>
+              </a:r>
+            </a:p>
+          </p:txBody>
+        </p:sp>
+        <p:sp>
+          <p:nvSpPr>
+            <p:cNvPr id="92" name="Rectangle 91">
+              <a:extLst>
+                <a:ext uri="{FF2B5EF4-FFF2-40B4-BE49-F238E27FC236}">
+                  <a16:creationId xmlns:a16="http://schemas.microsoft.com/office/drawing/2014/main" id="{CF2BFC28-4D1E-48EF-B59C-24FA8EF43CF3}"/>
+                </a:ext>
+              </a:extLst>
+            </p:cNvPr>
+            <p:cNvSpPr/>
+            <p:nvPr/>
+          </p:nvSpPr>
+          <p:spPr>
+            <a:xfrm>
+              <a:off x="7252326" y="1863340"/>
+              <a:ext cx="2471738" cy="139147"/>
+            </a:xfrm>
+            <a:prstGeom prst="rect">
+              <a:avLst/>
+            </a:prstGeom>
+            <a:noFill/>
+            <a:ln>
+              <a:solidFill>
+                <a:srgbClr val="CCCCCC"/>
+              </a:solidFill>
+            </a:ln>
+          </p:spPr>
+          <p:style>
+            <a:lnRef idx="2">
+              <a:schemeClr val="accent1">
+                <a:shade val="50000"/>
+              </a:schemeClr>
+            </a:lnRef>
+            <a:fillRef idx="1">
+              <a:schemeClr val="accent1"/>
+            </a:fillRef>
+            <a:effectRef idx="0">
+              <a:schemeClr val="accent1"/>
+            </a:effectRef>
+            <a:fontRef idx="minor">
+              <a:schemeClr val="lt1"/>
+            </a:fontRef>
+          </p:style>
+          <p:txBody>
+            <a:bodyPr rtlCol="0" anchor="ctr"/>
+            <a:lstStyle/>
+            <a:p>
+              <a:r>
+                <a:rPr lang="en-US" sz="700" i="1" dirty="0">
+                  <a:solidFill>
+                    <a:schemeClr val="bg1">
+                      <a:lumMod val="50000"/>
+                    </a:schemeClr>
+                  </a:solidFill>
+                </a:rPr>
+                <a:t>&lt;enter a project note (optional)&gt;</a:t>
+              </a:r>
+            </a:p>
+          </p:txBody>
+        </p:sp>
+        <p:sp>
+          <p:nvSpPr>
+            <p:cNvPr id="93" name="TextBox 92">
+              <a:extLst>
+                <a:ext uri="{FF2B5EF4-FFF2-40B4-BE49-F238E27FC236}">
+                  <a16:creationId xmlns:a16="http://schemas.microsoft.com/office/drawing/2014/main" id="{24C3E814-EC5B-458D-B610-E627099C3B5A}"/>
+                </a:ext>
+              </a:extLst>
+            </p:cNvPr>
+            <p:cNvSpPr txBox="1"/>
+            <p:nvPr/>
+          </p:nvSpPr>
+          <p:spPr>
+            <a:xfrm>
+              <a:off x="7150529" y="1694256"/>
+              <a:ext cx="1322784" cy="200055"/>
+            </a:xfrm>
+            <a:prstGeom prst="rect">
+              <a:avLst/>
+            </a:prstGeom>
+            <a:noFill/>
+          </p:spPr>
+          <p:txBody>
+            <a:bodyPr wrap="square" rtlCol="0">
+              <a:spAutoFit/>
+            </a:bodyPr>
+            <a:lstStyle/>
+            <a:p>
+              <a:r>
+                <a:rPr lang="en-US" sz="700" dirty="0">
+                  <a:latin typeface="Arial" panose="020B0604020202020204" pitchFamily="34" charset="0"/>
+                  <a:cs typeface="Arial" panose="020B0604020202020204" pitchFamily="34" charset="0"/>
+                </a:rPr>
+                <a:t>Project Note</a:t>
+              </a:r>
+            </a:p>
+          </p:txBody>
+        </p:sp>
+      </p:grpSp>
+      <p:grpSp>
+        <p:nvGrpSpPr>
+          <p:cNvPr id="96" name="Group 95">
+            <a:extLst>
+              <a:ext uri="{FF2B5EF4-FFF2-40B4-BE49-F238E27FC236}">
+                <a16:creationId xmlns:a16="http://schemas.microsoft.com/office/drawing/2014/main" id="{BA13A2AB-9C76-4972-9356-B570B40F4E73}"/>
+              </a:ext>
+            </a:extLst>
+          </p:cNvPr>
+          <p:cNvGrpSpPr/>
+          <p:nvPr/>
+        </p:nvGrpSpPr>
+        <p:grpSpPr>
+          <a:xfrm>
+            <a:off x="7049920" y="3025465"/>
+            <a:ext cx="3160644" cy="806251"/>
+            <a:chOff x="7049920" y="925635"/>
+            <a:chExt cx="3160644" cy="806251"/>
+          </a:xfrm>
+        </p:grpSpPr>
+        <p:sp>
+          <p:nvSpPr>
+            <p:cNvPr id="97" name="Rectangle 96">
+              <a:extLst>
+                <a:ext uri="{FF2B5EF4-FFF2-40B4-BE49-F238E27FC236}">
+                  <a16:creationId xmlns:a16="http://schemas.microsoft.com/office/drawing/2014/main" id="{69C65C62-6953-4B6E-AD40-91E620FDDAC0}"/>
+                </a:ext>
+              </a:extLst>
+            </p:cNvPr>
+            <p:cNvSpPr/>
+            <p:nvPr/>
+          </p:nvSpPr>
+          <p:spPr>
+            <a:xfrm>
+              <a:off x="7049920" y="1064781"/>
+              <a:ext cx="3160644" cy="667105"/>
+            </a:xfrm>
+            <a:prstGeom prst="rect">
+              <a:avLst/>
+            </a:prstGeom>
+            <a:solidFill>
+              <a:srgbClr val="FFFFFF"/>
+            </a:solidFill>
+            <a:ln>
+              <a:solidFill>
+                <a:srgbClr val="FF307C"/>
+              </a:solidFill>
+            </a:ln>
+          </p:spPr>
+          <p:style>
+            <a:lnRef idx="2">
+              <a:schemeClr val="accent1">
+                <a:shade val="50000"/>
+              </a:schemeClr>
+            </a:lnRef>
+            <a:fillRef idx="1">
+              <a:schemeClr val="accent1"/>
+            </a:fillRef>
+            <a:effectRef idx="0">
+              <a:schemeClr val="accent1"/>
+            </a:effectRef>
+            <a:fontRef idx="minor">
+              <a:schemeClr val="lt1"/>
+            </a:fontRef>
+          </p:style>
+          <p:txBody>
+            <a:bodyPr rtlCol="0" anchor="ctr"/>
+            <a:lstStyle/>
+            <a:p>
+              <a:pPr algn="ctr"/>
+              <a:endParaRPr lang="en-US" dirty="0"/>
+            </a:p>
+          </p:txBody>
+        </p:sp>
+        <p:sp>
+          <p:nvSpPr>
+            <p:cNvPr id="98" name="Rectangle 97">
+              <a:extLst>
+                <a:ext uri="{FF2B5EF4-FFF2-40B4-BE49-F238E27FC236}">
+                  <a16:creationId xmlns:a16="http://schemas.microsoft.com/office/drawing/2014/main" id="{5153C031-9ACD-4428-AE32-EBF74940F7FE}"/>
+                </a:ext>
+              </a:extLst>
+            </p:cNvPr>
+            <p:cNvSpPr/>
+            <p:nvPr/>
+          </p:nvSpPr>
+          <p:spPr>
+            <a:xfrm>
+              <a:off x="7049920" y="925635"/>
+              <a:ext cx="3160643" cy="139147"/>
+            </a:xfrm>
+            <a:prstGeom prst="rect">
+              <a:avLst/>
+            </a:prstGeom>
+            <a:solidFill>
+              <a:srgbClr val="FF307C"/>
+            </a:solidFill>
+            <a:ln>
+              <a:solidFill>
+                <a:srgbClr val="FF307C"/>
+              </a:solidFill>
+            </a:ln>
+          </p:spPr>
+          <p:style>
+            <a:lnRef idx="2">
+              <a:schemeClr val="accent1">
+                <a:shade val="50000"/>
+              </a:schemeClr>
+            </a:lnRef>
+            <a:fillRef idx="1">
+              <a:schemeClr val="accent1"/>
+            </a:fillRef>
+            <a:effectRef idx="0">
+              <a:schemeClr val="accent1"/>
+            </a:effectRef>
+            <a:fontRef idx="minor">
+              <a:schemeClr val="lt1"/>
+            </a:fontRef>
+          </p:style>
+          <p:txBody>
+            <a:bodyPr rtlCol="0" anchor="ctr"/>
+            <a:lstStyle/>
+            <a:p>
+              <a:r>
+                <a:rPr lang="en-US" sz="700" dirty="0">
+                  <a:latin typeface="Arial" panose="020B0604020202020204" pitchFamily="34" charset="0"/>
+                  <a:cs typeface="Arial" panose="020B0604020202020204" pitchFamily="34" charset="0"/>
+                </a:rPr>
+                <a:t>Revit Logger - Progress</a:t>
+              </a:r>
+            </a:p>
+          </p:txBody>
+        </p:sp>
+        <p:sp>
+          <p:nvSpPr>
+            <p:cNvPr id="102" name="Rectangle: Rounded Corners 101">
+              <a:extLst>
+                <a:ext uri="{FF2B5EF4-FFF2-40B4-BE49-F238E27FC236}">
+                  <a16:creationId xmlns:a16="http://schemas.microsoft.com/office/drawing/2014/main" id="{6CD0A41D-FA32-4F17-A5A9-AA7D00988446}"/>
+                </a:ext>
+              </a:extLst>
+            </p:cNvPr>
+            <p:cNvSpPr/>
+            <p:nvPr/>
+          </p:nvSpPr>
+          <p:spPr>
+            <a:xfrm>
+              <a:off x="7150529" y="1315172"/>
+              <a:ext cx="2999780" cy="245959"/>
+            </a:xfrm>
+            <a:prstGeom prst="roundRect">
+              <a:avLst>
+                <a:gd name="adj" fmla="val 5201"/>
+              </a:avLst>
+            </a:prstGeom>
+            <a:gradFill flip="none" rotWithShape="1">
+              <a:gsLst>
+                <a:gs pos="0">
+                  <a:srgbClr val="FF522F"/>
+                </a:gs>
+                <a:gs pos="54000">
+                  <a:srgbClr val="FF522F"/>
+                </a:gs>
+                <a:gs pos="54000">
+                  <a:schemeClr val="bg1">
+                    <a:lumMod val="95000"/>
+                  </a:schemeClr>
+                </a:gs>
+              </a:gsLst>
+              <a:lin ang="0" scaled="1"/>
+              <a:tileRect/>
+            </a:gradFill>
+            <a:ln>
+              <a:solidFill>
+                <a:srgbClr val="333F50"/>
+              </a:solidFill>
+            </a:ln>
+          </p:spPr>
+          <p:style>
+            <a:lnRef idx="2">
+              <a:schemeClr val="accent1">
+                <a:shade val="50000"/>
+              </a:schemeClr>
+            </a:lnRef>
+            <a:fillRef idx="1">
+              <a:schemeClr val="accent1"/>
+            </a:fillRef>
+            <a:effectRef idx="0">
+              <a:schemeClr val="accent1"/>
+            </a:effectRef>
+            <a:fontRef idx="minor">
+              <a:schemeClr val="lt1"/>
+            </a:fontRef>
+          </p:style>
+          <p:txBody>
+            <a:bodyPr rtlCol="0" anchor="ctr"/>
+            <a:lstStyle/>
+            <a:p>
+              <a:pPr algn="ctr"/>
+              <a:endParaRPr lang="en-US" dirty="0"/>
+            </a:p>
+          </p:txBody>
+        </p:sp>
+        <p:sp>
+          <p:nvSpPr>
+            <p:cNvPr id="103" name="TextBox 102">
+              <a:extLst>
+                <a:ext uri="{FF2B5EF4-FFF2-40B4-BE49-F238E27FC236}">
+                  <a16:creationId xmlns:a16="http://schemas.microsoft.com/office/drawing/2014/main" id="{1496BC2E-728B-46DA-AFA1-B12C05AB605F}"/>
+                </a:ext>
+              </a:extLst>
+            </p:cNvPr>
+            <p:cNvSpPr txBox="1"/>
+            <p:nvPr/>
+          </p:nvSpPr>
+          <p:spPr>
+            <a:xfrm>
+              <a:off x="7049920" y="1102792"/>
+              <a:ext cx="1322784" cy="200055"/>
+            </a:xfrm>
+            <a:prstGeom prst="rect">
+              <a:avLst/>
+            </a:prstGeom>
+            <a:noFill/>
+          </p:spPr>
+          <p:txBody>
+            <a:bodyPr wrap="square" rtlCol="0">
+              <a:spAutoFit/>
+            </a:bodyPr>
+            <a:lstStyle/>
+            <a:p>
+              <a:r>
+                <a:rPr lang="en-US" sz="700" dirty="0">
+                  <a:latin typeface="Arial" panose="020B0604020202020204" pitchFamily="34" charset="0"/>
+                  <a:cs typeface="Arial" panose="020B0604020202020204" pitchFamily="34" charset="0"/>
+                </a:rPr>
+                <a:t>Log Progress</a:t>
+              </a:r>
+            </a:p>
+          </p:txBody>
+        </p:sp>
+      </p:grpSp>
+      <p:sp>
+        <p:nvSpPr>
+          <p:cNvPr id="79" name="TextBox 78">
+            <a:extLst>
+              <a:ext uri="{FF2B5EF4-FFF2-40B4-BE49-F238E27FC236}">
+                <a16:creationId xmlns:a16="http://schemas.microsoft.com/office/drawing/2014/main" id="{0C6735BB-9A42-4458-A198-5DF09895225C}"/>
+              </a:ext>
+            </a:extLst>
+          </p:cNvPr>
+          <p:cNvSpPr txBox="1"/>
+          <p:nvPr/>
+        </p:nvSpPr>
+        <p:spPr>
+          <a:xfrm>
+            <a:off x="9649781" y="1202898"/>
+            <a:ext cx="1322784" cy="200055"/>
+          </a:xfrm>
+          <a:prstGeom prst="rect">
+            <a:avLst/>
+          </a:prstGeom>
+          <a:noFill/>
+        </p:spPr>
+        <p:txBody>
+          <a:bodyPr wrap="square" rtlCol="0">
+            <a:spAutoFit/>
+          </a:bodyPr>
+          <a:lstStyle/>
+          <a:p>
+            <a:r>
+              <a:rPr lang="en-US" sz="700" u="sng" dirty="0">
+                <a:solidFill>
+                  <a:schemeClr val="bg1">
+                    <a:lumMod val="50000"/>
+                  </a:schemeClr>
+                </a:solidFill>
+                <a:latin typeface="Arial" panose="020B0604020202020204" pitchFamily="34" charset="0"/>
+                <a:cs typeface="Arial" panose="020B0604020202020204" pitchFamily="34" charset="0"/>
+              </a:rPr>
+              <a:t>Demo</a:t>
+            </a:r>
+          </a:p>
+        </p:txBody>
+      </p:sp>
+      <p:grpSp>
+        <p:nvGrpSpPr>
+          <p:cNvPr id="133" name="Group 132">
+            <a:extLst>
+              <a:ext uri="{FF2B5EF4-FFF2-40B4-BE49-F238E27FC236}">
+                <a16:creationId xmlns:a16="http://schemas.microsoft.com/office/drawing/2014/main" id="{A2B20267-65DD-4C4E-8977-BE161F24C2C5}"/>
+              </a:ext>
+            </a:extLst>
+          </p:cNvPr>
+          <p:cNvGrpSpPr/>
+          <p:nvPr/>
+        </p:nvGrpSpPr>
+        <p:grpSpPr>
+          <a:xfrm>
+            <a:off x="9567638" y="219075"/>
+            <a:ext cx="1667416" cy="492635"/>
+            <a:chOff x="6196013" y="219075"/>
+            <a:chExt cx="1667416" cy="492635"/>
+          </a:xfrm>
+        </p:grpSpPr>
+        <p:sp>
+          <p:nvSpPr>
+            <p:cNvPr id="7" name="Rectangle 6">
+              <a:extLst>
+                <a:ext uri="{FF2B5EF4-FFF2-40B4-BE49-F238E27FC236}">
+                  <a16:creationId xmlns:a16="http://schemas.microsoft.com/office/drawing/2014/main" id="{7C91AAA4-D085-45BF-9FE0-8EEB66675A16}"/>
+                </a:ext>
+              </a:extLst>
+            </p:cNvPr>
+            <p:cNvSpPr/>
+            <p:nvPr/>
+          </p:nvSpPr>
+          <p:spPr>
+            <a:xfrm>
+              <a:off x="6196013" y="219075"/>
+              <a:ext cx="1640652" cy="461963"/>
+            </a:xfrm>
+            <a:prstGeom prst="rect">
+              <a:avLst/>
+            </a:prstGeom>
+            <a:noFill/>
+            <a:ln w="6350">
+              <a:solidFill>
+                <a:srgbClr val="DDDDDD"/>
+              </a:solidFill>
+            </a:ln>
+          </p:spPr>
+          <p:style>
+            <a:lnRef idx="2">
+              <a:schemeClr val="accent1">
+                <a:shade val="50000"/>
+              </a:schemeClr>
+            </a:lnRef>
+            <a:fillRef idx="1">
+              <a:schemeClr val="accent1"/>
+            </a:fillRef>
+            <a:effectRef idx="0">
+              <a:schemeClr val="accent1"/>
+            </a:effectRef>
+            <a:fontRef idx="minor">
+              <a:schemeClr val="lt1"/>
+            </a:fontRef>
+          </p:style>
+          <p:txBody>
+            <a:bodyPr rtlCol="0" anchor="ctr"/>
+            <a:lstStyle/>
+            <a:p>
+              <a:pPr algn="ctr"/>
+              <a:endParaRPr lang="en-US"/>
+            </a:p>
+          </p:txBody>
+        </p:sp>
+        <p:pic>
+          <p:nvPicPr>
+            <p:cNvPr id="9" name="Graphic 8" descr="History with solid fill">
+              <a:extLst>
+                <a:ext uri="{FF2B5EF4-FFF2-40B4-BE49-F238E27FC236}">
+                  <a16:creationId xmlns:a16="http://schemas.microsoft.com/office/drawing/2014/main" id="{85DC94A7-8A6F-43FA-ACDC-A7A12D5C3F27}"/>
+                </a:ext>
+              </a:extLst>
+            </p:cNvPr>
+            <p:cNvPicPr>
+              <a:picLocks noChangeAspect="1"/>
+            </p:cNvPicPr>
+            <p:nvPr/>
+          </p:nvPicPr>
+          <p:blipFill>
+            <a:blip r:embed="rId3">
+              <a:extLst>
+                <a:ext uri="{28A0092B-C50C-407E-A947-70E740481C1C}">
+                  <a14:useLocalDpi xmlns:a14="http://schemas.microsoft.com/office/drawing/2010/main" val="0"/>
+                </a:ext>
+                <a:ext uri="{96DAC541-7B7A-43D3-8B79-37D633B846F1}">
+                  <asvg:svgBlip xmlns:asvg="http://schemas.microsoft.com/office/drawing/2016/SVG/main" r:embed="rId4"/>
+                </a:ext>
+              </a:extLst>
+            </a:blip>
+            <a:stretch>
+              <a:fillRect/>
+            </a:stretch>
+          </p:blipFill>
+          <p:spPr>
+            <a:xfrm>
+              <a:off x="6331392" y="240944"/>
+              <a:ext cx="228600" cy="228600"/>
+            </a:xfrm>
+            <a:prstGeom prst="rect">
+              <a:avLst/>
+            </a:prstGeom>
+          </p:spPr>
+        </p:pic>
+        <p:sp>
+          <p:nvSpPr>
+            <p:cNvPr id="12" name="TextBox 11">
+              <a:extLst>
+                <a:ext uri="{FF2B5EF4-FFF2-40B4-BE49-F238E27FC236}">
+                  <a16:creationId xmlns:a16="http://schemas.microsoft.com/office/drawing/2014/main" id="{057B6FA7-9335-4D0E-B1D9-35BB33576E63}"/>
+                </a:ext>
+              </a:extLst>
+            </p:cNvPr>
+            <p:cNvSpPr txBox="1"/>
+            <p:nvPr/>
+          </p:nvSpPr>
+          <p:spPr>
+            <a:xfrm>
+              <a:off x="6656580" y="542433"/>
+              <a:ext cx="670321" cy="169277"/>
+            </a:xfrm>
+            <a:prstGeom prst="rect">
+              <a:avLst/>
+            </a:prstGeom>
+            <a:noFill/>
+          </p:spPr>
+          <p:txBody>
+            <a:bodyPr wrap="square" rtlCol="0">
+              <a:spAutoFit/>
+            </a:bodyPr>
+            <a:lstStyle/>
+            <a:p>
+              <a:pPr algn="ctr"/>
+              <a:r>
+                <a:rPr lang="en-US" sz="500" dirty="0">
+                  <a:latin typeface="Arial" panose="020B0604020202020204" pitchFamily="34" charset="0"/>
+                  <a:cs typeface="Arial" panose="020B0604020202020204" pitchFamily="34" charset="0"/>
+                </a:rPr>
+                <a:t>Revit Logger</a:t>
+              </a:r>
+            </a:p>
+          </p:txBody>
+        </p:sp>
+        <p:pic>
+          <p:nvPicPr>
+            <p:cNvPr id="55" name="Graphic 54" descr="Single gear with solid fill">
+              <a:extLst>
+                <a:ext uri="{FF2B5EF4-FFF2-40B4-BE49-F238E27FC236}">
+                  <a16:creationId xmlns:a16="http://schemas.microsoft.com/office/drawing/2014/main" id="{20059527-C861-4FCA-AAB3-FCBF880F3D0F}"/>
+                </a:ext>
+              </a:extLst>
+            </p:cNvPr>
+            <p:cNvPicPr>
+              <a:picLocks noChangeAspect="1"/>
+            </p:cNvPicPr>
+            <p:nvPr/>
+          </p:nvPicPr>
+          <p:blipFill>
+            <a:blip r:embed="rId5">
+              <a:extLst>
+                <a:ext uri="{28A0092B-C50C-407E-A947-70E740481C1C}">
+                  <a14:useLocalDpi xmlns:a14="http://schemas.microsoft.com/office/drawing/2010/main" val="0"/>
+                </a:ext>
+                <a:ext uri="{96DAC541-7B7A-43D3-8B79-37D633B846F1}">
+                  <asvg:svgBlip xmlns:asvg="http://schemas.microsoft.com/office/drawing/2016/SVG/main" r:embed="rId6"/>
+                </a:ext>
+              </a:extLst>
+            </a:blip>
+            <a:stretch>
+              <a:fillRect/>
+            </a:stretch>
+          </p:blipFill>
+          <p:spPr>
+            <a:xfrm>
+              <a:off x="7088037" y="244872"/>
+              <a:ext cx="228600" cy="228600"/>
+            </a:xfrm>
+            <a:prstGeom prst="rect">
+              <a:avLst/>
+            </a:prstGeom>
+          </p:spPr>
+        </p:pic>
+        <p:pic>
+          <p:nvPicPr>
+            <p:cNvPr id="59" name="Graphic 58" descr="Clipboard with solid fill">
+              <a:extLst>
+                <a:ext uri="{FF2B5EF4-FFF2-40B4-BE49-F238E27FC236}">
+                  <a16:creationId xmlns:a16="http://schemas.microsoft.com/office/drawing/2014/main" id="{27A8D2BA-18E9-4591-81EC-B34C7BC8BC52}"/>
+                </a:ext>
+              </a:extLst>
+            </p:cNvPr>
+            <p:cNvPicPr>
+              <a:picLocks noChangeAspect="1"/>
+            </p:cNvPicPr>
+            <p:nvPr/>
+          </p:nvPicPr>
+          <p:blipFill>
+            <a:blip r:embed="rId7">
+              <a:extLst>
+                <a:ext uri="{28A0092B-C50C-407E-A947-70E740481C1C}">
+                  <a14:useLocalDpi xmlns:a14="http://schemas.microsoft.com/office/drawing/2010/main" val="0"/>
+                </a:ext>
+                <a:ext uri="{96DAC541-7B7A-43D3-8B79-37D633B846F1}">
+                  <asvg:svgBlip xmlns:asvg="http://schemas.microsoft.com/office/drawing/2016/SVG/main" r:embed="rId8"/>
+                </a:ext>
+              </a:extLst>
+            </a:blip>
+            <a:stretch>
+              <a:fillRect/>
+            </a:stretch>
+          </p:blipFill>
+          <p:spPr>
+            <a:xfrm>
+              <a:off x="6694541" y="226294"/>
+              <a:ext cx="228600" cy="228600"/>
+            </a:xfrm>
+            <a:prstGeom prst="rect">
+              <a:avLst/>
+            </a:prstGeom>
+          </p:spPr>
+        </p:pic>
+        <p:sp>
+          <p:nvSpPr>
+            <p:cNvPr id="109" name="TextBox 108">
+              <a:extLst>
+                <a:ext uri="{FF2B5EF4-FFF2-40B4-BE49-F238E27FC236}">
+                  <a16:creationId xmlns:a16="http://schemas.microsoft.com/office/drawing/2014/main" id="{06E568B0-E13C-4419-9541-C11B6A486E5C}"/>
+                </a:ext>
+              </a:extLst>
+            </p:cNvPr>
+            <p:cNvSpPr txBox="1"/>
+            <p:nvPr/>
+          </p:nvSpPr>
+          <p:spPr>
+            <a:xfrm>
+              <a:off x="6234711" y="431730"/>
+              <a:ext cx="404456" cy="169277"/>
+            </a:xfrm>
+            <a:prstGeom prst="rect">
+              <a:avLst/>
+            </a:prstGeom>
+            <a:noFill/>
+          </p:spPr>
+          <p:txBody>
+            <a:bodyPr wrap="square" rtlCol="0">
+              <a:spAutoFit/>
+            </a:bodyPr>
+            <a:lstStyle/>
+            <a:p>
+              <a:pPr algn="ctr"/>
+              <a:r>
+                <a:rPr lang="en-US" sz="500" dirty="0">
+                  <a:latin typeface="Arial" panose="020B0604020202020204" pitchFamily="34" charset="0"/>
+                  <a:cs typeface="Arial" panose="020B0604020202020204" pitchFamily="34" charset="0"/>
+                </a:rPr>
+                <a:t>On/Off</a:t>
+              </a:r>
+            </a:p>
+          </p:txBody>
+        </p:sp>
+        <p:sp>
+          <p:nvSpPr>
+            <p:cNvPr id="110" name="TextBox 109">
+              <a:extLst>
+                <a:ext uri="{FF2B5EF4-FFF2-40B4-BE49-F238E27FC236}">
+                  <a16:creationId xmlns:a16="http://schemas.microsoft.com/office/drawing/2014/main" id="{CD04020C-DFAC-4FC2-834D-6AC18C3B1B1B}"/>
+                </a:ext>
+              </a:extLst>
+            </p:cNvPr>
+            <p:cNvSpPr txBox="1"/>
+            <p:nvPr/>
+          </p:nvSpPr>
+          <p:spPr>
+            <a:xfrm>
+              <a:off x="6605858" y="431730"/>
+              <a:ext cx="404456" cy="169277"/>
+            </a:xfrm>
+            <a:prstGeom prst="rect">
+              <a:avLst/>
+            </a:prstGeom>
+            <a:noFill/>
+          </p:spPr>
+          <p:txBody>
+            <a:bodyPr wrap="square" rtlCol="0">
+              <a:spAutoFit/>
+            </a:bodyPr>
+            <a:lstStyle/>
+            <a:p>
+              <a:pPr algn="ctr"/>
+              <a:r>
+                <a:rPr lang="en-US" sz="500" dirty="0">
+                  <a:latin typeface="Arial" panose="020B0604020202020204" pitchFamily="34" charset="0"/>
+                  <a:cs typeface="Arial" panose="020B0604020202020204" pitchFamily="34" charset="0"/>
+                </a:rPr>
+                <a:t>Notes</a:t>
+              </a:r>
+            </a:p>
+          </p:txBody>
+        </p:sp>
+        <p:sp>
+          <p:nvSpPr>
+            <p:cNvPr id="111" name="TextBox 110">
+              <a:extLst>
+                <a:ext uri="{FF2B5EF4-FFF2-40B4-BE49-F238E27FC236}">
+                  <a16:creationId xmlns:a16="http://schemas.microsoft.com/office/drawing/2014/main" id="{C5E4A257-919E-463C-A53A-E638ED322701}"/>
+                </a:ext>
+              </a:extLst>
+            </p:cNvPr>
+            <p:cNvSpPr txBox="1"/>
+            <p:nvPr/>
+          </p:nvSpPr>
+          <p:spPr>
+            <a:xfrm>
+              <a:off x="6978515" y="431730"/>
+              <a:ext cx="471681" cy="169277"/>
+            </a:xfrm>
+            <a:prstGeom prst="rect">
+              <a:avLst/>
+            </a:prstGeom>
+            <a:noFill/>
+          </p:spPr>
+          <p:txBody>
+            <a:bodyPr wrap="square" rtlCol="0">
+              <a:spAutoFit/>
+            </a:bodyPr>
+            <a:lstStyle/>
+            <a:p>
+              <a:pPr algn="ctr"/>
+              <a:r>
+                <a:rPr lang="en-US" sz="500" dirty="0">
+                  <a:latin typeface="Arial" panose="020B0604020202020204" pitchFamily="34" charset="0"/>
+                  <a:cs typeface="Arial" panose="020B0604020202020204" pitchFamily="34" charset="0"/>
+                </a:rPr>
+                <a:t>Settings</a:t>
+              </a:r>
+            </a:p>
+          </p:txBody>
+        </p:sp>
+        <p:pic>
+          <p:nvPicPr>
+            <p:cNvPr id="131" name="Graphic 130" descr="Open folder with solid fill">
+              <a:extLst>
+                <a:ext uri="{FF2B5EF4-FFF2-40B4-BE49-F238E27FC236}">
+                  <a16:creationId xmlns:a16="http://schemas.microsoft.com/office/drawing/2014/main" id="{B845E64C-484D-4B5B-8AE3-AB3C8508C79C}"/>
+                </a:ext>
+              </a:extLst>
+            </p:cNvPr>
+            <p:cNvPicPr>
+              <a:picLocks noChangeAspect="1"/>
+            </p:cNvPicPr>
+            <p:nvPr/>
+          </p:nvPicPr>
+          <p:blipFill>
+            <a:blip r:embed="rId9">
+              <a:extLst>
+                <a:ext uri="{28A0092B-C50C-407E-A947-70E740481C1C}">
+                  <a14:useLocalDpi xmlns:a14="http://schemas.microsoft.com/office/drawing/2010/main" val="0"/>
+                </a:ext>
+                <a:ext uri="{96DAC541-7B7A-43D3-8B79-37D633B846F1}">
+                  <asvg:svgBlip xmlns:asvg="http://schemas.microsoft.com/office/drawing/2016/SVG/main" r:embed="rId10"/>
+                </a:ext>
+              </a:extLst>
+            </a:blip>
+            <a:stretch>
+              <a:fillRect/>
+            </a:stretch>
+          </p:blipFill>
+          <p:spPr>
+            <a:xfrm>
+              <a:off x="7492282" y="242261"/>
+              <a:ext cx="228600" cy="228600"/>
+            </a:xfrm>
+            <a:prstGeom prst="rect">
+              <a:avLst/>
+            </a:prstGeom>
+          </p:spPr>
+        </p:pic>
+        <p:sp>
+          <p:nvSpPr>
+            <p:cNvPr id="132" name="TextBox 131">
+              <a:extLst>
+                <a:ext uri="{FF2B5EF4-FFF2-40B4-BE49-F238E27FC236}">
+                  <a16:creationId xmlns:a16="http://schemas.microsoft.com/office/drawing/2014/main" id="{B1C5BAAB-0C8A-4106-9CFA-9DCFA93C51A5}"/>
+                </a:ext>
+              </a:extLst>
+            </p:cNvPr>
+            <p:cNvSpPr txBox="1"/>
+            <p:nvPr/>
+          </p:nvSpPr>
+          <p:spPr>
+            <a:xfrm>
+              <a:off x="7330659" y="431730"/>
+              <a:ext cx="532770" cy="246221"/>
+            </a:xfrm>
+            <a:prstGeom prst="rect">
+              <a:avLst/>
+            </a:prstGeom>
+            <a:noFill/>
+          </p:spPr>
+          <p:txBody>
+            <a:bodyPr wrap="square" rtlCol="0">
+              <a:spAutoFit/>
+            </a:bodyPr>
+            <a:lstStyle/>
+            <a:p>
+              <a:pPr algn="ctr"/>
+              <a:r>
+                <a:rPr lang="en-US" sz="500" dirty="0">
+                  <a:latin typeface="Arial" panose="020B0604020202020204" pitchFamily="34" charset="0"/>
+                  <a:cs typeface="Arial" panose="020B0604020202020204" pitchFamily="34" charset="0"/>
+                </a:rPr>
+                <a:t>Select From Log(s)</a:t>
+              </a:r>
+            </a:p>
+          </p:txBody>
+        </p:sp>
+      </p:grpSp>
+      <p:grpSp>
+        <p:nvGrpSpPr>
+          <p:cNvPr id="134" name="Group 133">
+            <a:extLst>
+              <a:ext uri="{FF2B5EF4-FFF2-40B4-BE49-F238E27FC236}">
+                <a16:creationId xmlns:a16="http://schemas.microsoft.com/office/drawing/2014/main" id="{B46A1C1E-AA34-4A5E-9C54-927CF880487E}"/>
+              </a:ext>
+            </a:extLst>
+          </p:cNvPr>
+          <p:cNvGrpSpPr/>
+          <p:nvPr/>
+        </p:nvGrpSpPr>
+        <p:grpSpPr>
+          <a:xfrm>
+            <a:off x="6216212" y="219075"/>
+            <a:ext cx="1667416" cy="492635"/>
+            <a:chOff x="6196013" y="219075"/>
+            <a:chExt cx="1667416" cy="492635"/>
+          </a:xfrm>
+        </p:grpSpPr>
+        <p:sp>
+          <p:nvSpPr>
+            <p:cNvPr id="135" name="Rectangle 134">
+              <a:extLst>
+                <a:ext uri="{FF2B5EF4-FFF2-40B4-BE49-F238E27FC236}">
+                  <a16:creationId xmlns:a16="http://schemas.microsoft.com/office/drawing/2014/main" id="{A2093A1E-613B-4A19-8C1C-97D194633AEA}"/>
+                </a:ext>
+              </a:extLst>
+            </p:cNvPr>
+            <p:cNvSpPr/>
+            <p:nvPr/>
+          </p:nvSpPr>
+          <p:spPr>
+            <a:xfrm>
+              <a:off x="6196013" y="219075"/>
+              <a:ext cx="1640652" cy="461963"/>
+            </a:xfrm>
+            <a:prstGeom prst="rect">
+              <a:avLst/>
+            </a:prstGeom>
+            <a:noFill/>
+            <a:ln w="6350">
+              <a:solidFill>
+                <a:srgbClr val="DDDDDD"/>
+              </a:solidFill>
+            </a:ln>
+          </p:spPr>
+          <p:style>
+            <a:lnRef idx="2">
+              <a:schemeClr val="accent1">
+                <a:shade val="50000"/>
+              </a:schemeClr>
+            </a:lnRef>
+            <a:fillRef idx="1">
+              <a:schemeClr val="accent1"/>
+            </a:fillRef>
+            <a:effectRef idx="0">
+              <a:schemeClr val="accent1"/>
+            </a:effectRef>
+            <a:fontRef idx="minor">
+              <a:schemeClr val="lt1"/>
+            </a:fontRef>
+          </p:style>
+          <p:txBody>
+            <a:bodyPr rtlCol="0" anchor="ctr"/>
+            <a:lstStyle/>
+            <a:p>
+              <a:pPr algn="ctr"/>
+              <a:endParaRPr lang="en-US"/>
+            </a:p>
+          </p:txBody>
+        </p:sp>
+        <p:pic>
+          <p:nvPicPr>
+            <p:cNvPr id="136" name="Graphic 135" descr="History with solid fill">
+              <a:extLst>
+                <a:ext uri="{FF2B5EF4-FFF2-40B4-BE49-F238E27FC236}">
+                  <a16:creationId xmlns:a16="http://schemas.microsoft.com/office/drawing/2014/main" id="{1C5EBF69-CF5D-4F94-A04E-A585BE94CBE6}"/>
+                </a:ext>
+              </a:extLst>
+            </p:cNvPr>
+            <p:cNvPicPr>
+              <a:picLocks noChangeAspect="1"/>
+            </p:cNvPicPr>
+            <p:nvPr/>
+          </p:nvPicPr>
+          <p:blipFill>
+            <a:blip r:embed="rId11">
+              <a:extLst>
+                <a:ext uri="{28A0092B-C50C-407E-A947-70E740481C1C}">
+                  <a14:useLocalDpi xmlns:a14="http://schemas.microsoft.com/office/drawing/2010/main" val="0"/>
+                </a:ext>
+                <a:ext uri="{96DAC541-7B7A-43D3-8B79-37D633B846F1}">
+                  <asvg:svgBlip xmlns:asvg="http://schemas.microsoft.com/office/drawing/2016/SVG/main" r:embed="rId12"/>
+                </a:ext>
+              </a:extLst>
+            </a:blip>
+            <a:stretch>
+              <a:fillRect/>
+            </a:stretch>
+          </p:blipFill>
+          <p:spPr>
+            <a:xfrm>
+              <a:off x="6331392" y="240944"/>
+              <a:ext cx="228600" cy="228600"/>
+            </a:xfrm>
+            <a:prstGeom prst="rect">
+              <a:avLst/>
+            </a:prstGeom>
+          </p:spPr>
+        </p:pic>
+        <p:sp>
+          <p:nvSpPr>
+            <p:cNvPr id="137" name="TextBox 136">
+              <a:extLst>
+                <a:ext uri="{FF2B5EF4-FFF2-40B4-BE49-F238E27FC236}">
+                  <a16:creationId xmlns:a16="http://schemas.microsoft.com/office/drawing/2014/main" id="{301938A0-9FBB-411B-8747-B27D43784DF8}"/>
+                </a:ext>
+              </a:extLst>
+            </p:cNvPr>
+            <p:cNvSpPr txBox="1"/>
+            <p:nvPr/>
+          </p:nvSpPr>
+          <p:spPr>
+            <a:xfrm>
+              <a:off x="6656580" y="542433"/>
+              <a:ext cx="670321" cy="169277"/>
+            </a:xfrm>
+            <a:prstGeom prst="rect">
+              <a:avLst/>
+            </a:prstGeom>
+            <a:noFill/>
+          </p:spPr>
+          <p:txBody>
+            <a:bodyPr wrap="square" rtlCol="0">
+              <a:spAutoFit/>
+            </a:bodyPr>
+            <a:lstStyle/>
+            <a:p>
+              <a:pPr algn="ctr"/>
+              <a:r>
+                <a:rPr lang="en-US" sz="500" dirty="0">
+                  <a:latin typeface="Arial" panose="020B0604020202020204" pitchFamily="34" charset="0"/>
+                  <a:cs typeface="Arial" panose="020B0604020202020204" pitchFamily="34" charset="0"/>
+                </a:rPr>
+                <a:t>Revit Logger</a:t>
+              </a:r>
+            </a:p>
+          </p:txBody>
+        </p:sp>
+        <p:pic>
+          <p:nvPicPr>
+            <p:cNvPr id="138" name="Graphic 137" descr="Single gear with solid fill">
+              <a:extLst>
+                <a:ext uri="{FF2B5EF4-FFF2-40B4-BE49-F238E27FC236}">
+                  <a16:creationId xmlns:a16="http://schemas.microsoft.com/office/drawing/2014/main" id="{76A77EB3-FCA1-4D39-A2B5-C82EE26DCEE1}"/>
+                </a:ext>
+              </a:extLst>
+            </p:cNvPr>
+            <p:cNvPicPr>
+              <a:picLocks noChangeAspect="1"/>
+            </p:cNvPicPr>
+            <p:nvPr/>
+          </p:nvPicPr>
+          <p:blipFill>
+            <a:blip r:embed="rId5">
+              <a:extLst>
+                <a:ext uri="{28A0092B-C50C-407E-A947-70E740481C1C}">
+                  <a14:useLocalDpi xmlns:a14="http://schemas.microsoft.com/office/drawing/2010/main" val="0"/>
+                </a:ext>
+                <a:ext uri="{96DAC541-7B7A-43D3-8B79-37D633B846F1}">
+                  <asvg:svgBlip xmlns:asvg="http://schemas.microsoft.com/office/drawing/2016/SVG/main" r:embed="rId6"/>
+                </a:ext>
+              </a:extLst>
+            </a:blip>
+            <a:stretch>
+              <a:fillRect/>
+            </a:stretch>
+          </p:blipFill>
+          <p:spPr>
+            <a:xfrm>
+              <a:off x="7088037" y="244872"/>
+              <a:ext cx="228600" cy="228600"/>
+            </a:xfrm>
+            <a:prstGeom prst="rect">
+              <a:avLst/>
+            </a:prstGeom>
+          </p:spPr>
+        </p:pic>
+        <p:pic>
+          <p:nvPicPr>
+            <p:cNvPr id="139" name="Graphic 138" descr="Clipboard with solid fill">
+              <a:extLst>
+                <a:ext uri="{FF2B5EF4-FFF2-40B4-BE49-F238E27FC236}">
+                  <a16:creationId xmlns:a16="http://schemas.microsoft.com/office/drawing/2014/main" id="{CF1AE79A-CC94-45BE-931D-D1DDCDD5C964}"/>
+                </a:ext>
+              </a:extLst>
+            </p:cNvPr>
+            <p:cNvPicPr>
+              <a:picLocks noChangeAspect="1"/>
+            </p:cNvPicPr>
+            <p:nvPr/>
+          </p:nvPicPr>
+          <p:blipFill>
+            <a:blip r:embed="rId13">
+              <a:extLst>
+                <a:ext uri="{28A0092B-C50C-407E-A947-70E740481C1C}">
+                  <a14:useLocalDpi xmlns:a14="http://schemas.microsoft.com/office/drawing/2010/main" val="0"/>
+                </a:ext>
+                <a:ext uri="{96DAC541-7B7A-43D3-8B79-37D633B846F1}">
+                  <asvg:svgBlip xmlns:asvg="http://schemas.microsoft.com/office/drawing/2016/SVG/main" r:embed="rId14"/>
+                </a:ext>
+              </a:extLst>
+            </a:blip>
+            <a:stretch>
+              <a:fillRect/>
+            </a:stretch>
+          </p:blipFill>
+          <p:spPr>
+            <a:xfrm>
+              <a:off x="6694541" y="226294"/>
+              <a:ext cx="228600" cy="228600"/>
+            </a:xfrm>
+            <a:prstGeom prst="rect">
+              <a:avLst/>
+            </a:prstGeom>
+          </p:spPr>
+        </p:pic>
+        <p:sp>
+          <p:nvSpPr>
+            <p:cNvPr id="140" name="TextBox 139">
+              <a:extLst>
+                <a:ext uri="{FF2B5EF4-FFF2-40B4-BE49-F238E27FC236}">
+                  <a16:creationId xmlns:a16="http://schemas.microsoft.com/office/drawing/2014/main" id="{DE2C59B0-24E4-411E-8F2F-77565700BB98}"/>
+                </a:ext>
+              </a:extLst>
+            </p:cNvPr>
+            <p:cNvSpPr txBox="1"/>
+            <p:nvPr/>
+          </p:nvSpPr>
+          <p:spPr>
+            <a:xfrm>
+              <a:off x="6234711" y="431730"/>
+              <a:ext cx="404456" cy="169277"/>
+            </a:xfrm>
+            <a:prstGeom prst="rect">
+              <a:avLst/>
+            </a:prstGeom>
+            <a:noFill/>
+          </p:spPr>
+          <p:txBody>
+            <a:bodyPr wrap="square" rtlCol="0">
+              <a:spAutoFit/>
+            </a:bodyPr>
+            <a:lstStyle/>
+            <a:p>
+              <a:pPr algn="ctr"/>
+              <a:r>
+                <a:rPr lang="en-US" sz="500" dirty="0">
+                  <a:latin typeface="Arial" panose="020B0604020202020204" pitchFamily="34" charset="0"/>
+                  <a:cs typeface="Arial" panose="020B0604020202020204" pitchFamily="34" charset="0"/>
+                </a:rPr>
+                <a:t>On/Off</a:t>
+              </a:r>
+            </a:p>
+          </p:txBody>
+        </p:sp>
+        <p:sp>
+          <p:nvSpPr>
+            <p:cNvPr id="141" name="TextBox 140">
+              <a:extLst>
+                <a:ext uri="{FF2B5EF4-FFF2-40B4-BE49-F238E27FC236}">
+                  <a16:creationId xmlns:a16="http://schemas.microsoft.com/office/drawing/2014/main" id="{C538B7D1-1799-414F-8091-6DDDC83405DB}"/>
+                </a:ext>
+              </a:extLst>
+            </p:cNvPr>
+            <p:cNvSpPr txBox="1"/>
+            <p:nvPr/>
+          </p:nvSpPr>
+          <p:spPr>
+            <a:xfrm>
+              <a:off x="6605858" y="431730"/>
+              <a:ext cx="404456" cy="169277"/>
+            </a:xfrm>
+            <a:prstGeom prst="rect">
+              <a:avLst/>
+            </a:prstGeom>
+            <a:noFill/>
+          </p:spPr>
+          <p:txBody>
+            <a:bodyPr wrap="square" rtlCol="0">
+              <a:spAutoFit/>
+            </a:bodyPr>
+            <a:lstStyle/>
+            <a:p>
+              <a:pPr algn="ctr"/>
+              <a:r>
+                <a:rPr lang="en-US" sz="500" dirty="0">
+                  <a:latin typeface="Arial" panose="020B0604020202020204" pitchFamily="34" charset="0"/>
+                  <a:cs typeface="Arial" panose="020B0604020202020204" pitchFamily="34" charset="0"/>
+                </a:rPr>
+                <a:t>Notes</a:t>
+              </a:r>
+            </a:p>
+          </p:txBody>
+        </p:sp>
+        <p:sp>
+          <p:nvSpPr>
+            <p:cNvPr id="142" name="TextBox 141">
+              <a:extLst>
+                <a:ext uri="{FF2B5EF4-FFF2-40B4-BE49-F238E27FC236}">
+                  <a16:creationId xmlns:a16="http://schemas.microsoft.com/office/drawing/2014/main" id="{C524A447-92B7-467A-B5B7-BC95F7CBADFC}"/>
+                </a:ext>
+              </a:extLst>
+            </p:cNvPr>
+            <p:cNvSpPr txBox="1"/>
+            <p:nvPr/>
+          </p:nvSpPr>
+          <p:spPr>
+            <a:xfrm>
+              <a:off x="6978515" y="431730"/>
+              <a:ext cx="471681" cy="169277"/>
+            </a:xfrm>
+            <a:prstGeom prst="rect">
+              <a:avLst/>
+            </a:prstGeom>
+            <a:noFill/>
+          </p:spPr>
+          <p:txBody>
+            <a:bodyPr wrap="square" rtlCol="0">
+              <a:spAutoFit/>
+            </a:bodyPr>
+            <a:lstStyle/>
+            <a:p>
+              <a:pPr algn="ctr"/>
+              <a:r>
+                <a:rPr lang="en-US" sz="500" dirty="0">
+                  <a:latin typeface="Arial" panose="020B0604020202020204" pitchFamily="34" charset="0"/>
+                  <a:cs typeface="Arial" panose="020B0604020202020204" pitchFamily="34" charset="0"/>
+                </a:rPr>
+                <a:t>Settings</a:t>
+              </a:r>
+            </a:p>
+          </p:txBody>
+        </p:sp>
+        <p:pic>
+          <p:nvPicPr>
+            <p:cNvPr id="143" name="Graphic 142" descr="Open folder with solid fill">
+              <a:extLst>
+                <a:ext uri="{FF2B5EF4-FFF2-40B4-BE49-F238E27FC236}">
+                  <a16:creationId xmlns:a16="http://schemas.microsoft.com/office/drawing/2014/main" id="{854831F6-CA9D-4D4D-BE22-91BE565DA492}"/>
+                </a:ext>
+              </a:extLst>
+            </p:cNvPr>
+            <p:cNvPicPr>
+              <a:picLocks noChangeAspect="1"/>
+            </p:cNvPicPr>
+            <p:nvPr/>
+          </p:nvPicPr>
+          <p:blipFill>
+            <a:blip r:embed="rId9">
+              <a:extLst>
+                <a:ext uri="{28A0092B-C50C-407E-A947-70E740481C1C}">
+                  <a14:useLocalDpi xmlns:a14="http://schemas.microsoft.com/office/drawing/2010/main" val="0"/>
+                </a:ext>
+                <a:ext uri="{96DAC541-7B7A-43D3-8B79-37D633B846F1}">
+                  <asvg:svgBlip xmlns:asvg="http://schemas.microsoft.com/office/drawing/2016/SVG/main" r:embed="rId10"/>
+                </a:ext>
+              </a:extLst>
+            </a:blip>
+            <a:stretch>
+              <a:fillRect/>
+            </a:stretch>
+          </p:blipFill>
+          <p:spPr>
+            <a:xfrm>
+              <a:off x="7492282" y="242261"/>
+              <a:ext cx="228600" cy="228600"/>
+            </a:xfrm>
+            <a:prstGeom prst="rect">
+              <a:avLst/>
+            </a:prstGeom>
+          </p:spPr>
+        </p:pic>
+        <p:sp>
+          <p:nvSpPr>
+            <p:cNvPr id="144" name="TextBox 143">
+              <a:extLst>
+                <a:ext uri="{FF2B5EF4-FFF2-40B4-BE49-F238E27FC236}">
+                  <a16:creationId xmlns:a16="http://schemas.microsoft.com/office/drawing/2014/main" id="{F91568DB-1526-48A9-B5F9-370388D2AE8F}"/>
+                </a:ext>
+              </a:extLst>
+            </p:cNvPr>
+            <p:cNvSpPr txBox="1"/>
+            <p:nvPr/>
+          </p:nvSpPr>
+          <p:spPr>
+            <a:xfrm>
+              <a:off x="7330659" y="431730"/>
+              <a:ext cx="532770" cy="246221"/>
+            </a:xfrm>
+            <a:prstGeom prst="rect">
+              <a:avLst/>
+            </a:prstGeom>
+            <a:noFill/>
+          </p:spPr>
+          <p:txBody>
+            <a:bodyPr wrap="square" rtlCol="0">
+              <a:spAutoFit/>
+            </a:bodyPr>
+            <a:lstStyle/>
+            <a:p>
+              <a:pPr algn="ctr"/>
+              <a:r>
+                <a:rPr lang="en-US" sz="500" dirty="0">
+                  <a:latin typeface="Arial" panose="020B0604020202020204" pitchFamily="34" charset="0"/>
+                  <a:cs typeface="Arial" panose="020B0604020202020204" pitchFamily="34" charset="0"/>
+                </a:rPr>
+                <a:t>Select From Log(s)</a:t>
+              </a:r>
+            </a:p>
+          </p:txBody>
+        </p:sp>
+      </p:grpSp>
+      <p:grpSp>
+        <p:nvGrpSpPr>
+          <p:cNvPr id="148" name="Group 147">
+            <a:extLst>
+              <a:ext uri="{FF2B5EF4-FFF2-40B4-BE49-F238E27FC236}">
+                <a16:creationId xmlns:a16="http://schemas.microsoft.com/office/drawing/2014/main" id="{7EFB70C8-1C5D-409A-9843-41E16032D21E}"/>
+              </a:ext>
+            </a:extLst>
+          </p:cNvPr>
+          <p:cNvGrpSpPr/>
+          <p:nvPr/>
+        </p:nvGrpSpPr>
+        <p:grpSpPr>
+          <a:xfrm>
+            <a:off x="3005634" y="292202"/>
+            <a:ext cx="3160644" cy="3631125"/>
+            <a:chOff x="3005634" y="925635"/>
+            <a:chExt cx="3160644" cy="3631125"/>
+          </a:xfrm>
+        </p:grpSpPr>
+        <p:sp>
+          <p:nvSpPr>
+            <p:cNvPr id="13" name="Rectangle 12">
+              <a:extLst>
+                <a:ext uri="{FF2B5EF4-FFF2-40B4-BE49-F238E27FC236}">
+                  <a16:creationId xmlns:a16="http://schemas.microsoft.com/office/drawing/2014/main" id="{4DF97647-B4F2-402E-B03C-7F4C2A58F0E7}"/>
+                </a:ext>
+              </a:extLst>
+            </p:cNvPr>
+            <p:cNvSpPr/>
+            <p:nvPr/>
+          </p:nvSpPr>
+          <p:spPr>
+            <a:xfrm>
+              <a:off x="3005634" y="1064781"/>
+              <a:ext cx="3160644" cy="3491979"/>
+            </a:xfrm>
+            <a:prstGeom prst="rect">
+              <a:avLst/>
+            </a:prstGeom>
+            <a:solidFill>
+              <a:srgbClr val="FFFFFF"/>
+            </a:solidFill>
+            <a:ln>
+              <a:solidFill>
+                <a:srgbClr val="FF307C"/>
+              </a:solidFill>
+            </a:ln>
+          </p:spPr>
+          <p:style>
+            <a:lnRef idx="2">
+              <a:schemeClr val="accent1">
+                <a:shade val="50000"/>
+              </a:schemeClr>
+            </a:lnRef>
+            <a:fillRef idx="1">
+              <a:schemeClr val="accent1"/>
+            </a:fillRef>
+            <a:effectRef idx="0">
+              <a:schemeClr val="accent1"/>
+            </a:effectRef>
+            <a:fontRef idx="minor">
+              <a:schemeClr val="lt1"/>
+            </a:fontRef>
+          </p:style>
+          <p:txBody>
+            <a:bodyPr rtlCol="0" anchor="ctr"/>
+            <a:lstStyle/>
+            <a:p>
+              <a:pPr algn="ctr"/>
+              <a:endParaRPr lang="en-US" dirty="0"/>
+            </a:p>
+          </p:txBody>
+        </p:sp>
+        <p:sp>
+          <p:nvSpPr>
+            <p:cNvPr id="14" name="Rectangle 13">
+              <a:extLst>
+                <a:ext uri="{FF2B5EF4-FFF2-40B4-BE49-F238E27FC236}">
+                  <a16:creationId xmlns:a16="http://schemas.microsoft.com/office/drawing/2014/main" id="{2AF2967C-4C57-48C6-85E8-7C68942CA518}"/>
+                </a:ext>
+              </a:extLst>
+            </p:cNvPr>
+            <p:cNvSpPr/>
+            <p:nvPr/>
+          </p:nvSpPr>
+          <p:spPr>
+            <a:xfrm>
+              <a:off x="3005634" y="925635"/>
+              <a:ext cx="3160643" cy="139147"/>
+            </a:xfrm>
+            <a:prstGeom prst="rect">
+              <a:avLst/>
+            </a:prstGeom>
+            <a:solidFill>
+              <a:srgbClr val="FF307C"/>
+            </a:solidFill>
+            <a:ln>
+              <a:solidFill>
+                <a:srgbClr val="FF307C"/>
+              </a:solidFill>
+            </a:ln>
+          </p:spPr>
+          <p:style>
+            <a:lnRef idx="2">
+              <a:schemeClr val="accent1">
+                <a:shade val="50000"/>
+              </a:schemeClr>
+            </a:lnRef>
+            <a:fillRef idx="1">
+              <a:schemeClr val="accent1"/>
+            </a:fillRef>
+            <a:effectRef idx="0">
+              <a:schemeClr val="accent1"/>
+            </a:effectRef>
+            <a:fontRef idx="minor">
+              <a:schemeClr val="lt1"/>
+            </a:fontRef>
+          </p:style>
+          <p:txBody>
+            <a:bodyPr rtlCol="0" anchor="ctr"/>
+            <a:lstStyle/>
+            <a:p>
+              <a:r>
+                <a:rPr lang="en-US" sz="700" dirty="0">
+                  <a:latin typeface="Arial" panose="020B0604020202020204" pitchFamily="34" charset="0"/>
+                  <a:cs typeface="Arial" panose="020B0604020202020204" pitchFamily="34" charset="0"/>
+                </a:rPr>
+                <a:t>Revit Logger - Settings</a:t>
+              </a:r>
+            </a:p>
+          </p:txBody>
+        </p:sp>
+        <p:sp>
+          <p:nvSpPr>
+            <p:cNvPr id="15" name="Rectangle 14">
+              <a:extLst>
+                <a:ext uri="{FF2B5EF4-FFF2-40B4-BE49-F238E27FC236}">
+                  <a16:creationId xmlns:a16="http://schemas.microsoft.com/office/drawing/2014/main" id="{1669D99D-E5A0-45BD-BF2A-6841CB232182}"/>
+                </a:ext>
+              </a:extLst>
+            </p:cNvPr>
+            <p:cNvSpPr/>
+            <p:nvPr/>
+          </p:nvSpPr>
+          <p:spPr>
+            <a:xfrm>
+              <a:off x="3212803" y="1547732"/>
+              <a:ext cx="2471738" cy="139147"/>
+            </a:xfrm>
+            <a:prstGeom prst="rect">
+              <a:avLst/>
+            </a:prstGeom>
+            <a:noFill/>
+            <a:ln>
+              <a:solidFill>
+                <a:srgbClr val="CCCCCC"/>
+              </a:solidFill>
+            </a:ln>
+          </p:spPr>
+          <p:style>
+            <a:lnRef idx="2">
+              <a:schemeClr val="accent1">
+                <a:shade val="50000"/>
+              </a:schemeClr>
+            </a:lnRef>
+            <a:fillRef idx="1">
+              <a:schemeClr val="accent1"/>
+            </a:fillRef>
+            <a:effectRef idx="0">
+              <a:schemeClr val="accent1"/>
+            </a:effectRef>
+            <a:fontRef idx="minor">
+              <a:schemeClr val="lt1"/>
+            </a:fontRef>
+          </p:style>
+          <p:txBody>
+            <a:bodyPr rtlCol="0" anchor="ctr"/>
+            <a:lstStyle/>
+            <a:p>
+              <a:r>
+                <a:rPr lang="en-US" sz="700" i="1" dirty="0">
+                  <a:solidFill>
+                    <a:schemeClr val="bg1">
+                      <a:lumMod val="50000"/>
+                    </a:schemeClr>
+                  </a:solidFill>
+                </a:rPr>
+                <a:t>&lt;pick a location to save logs&gt; (required)</a:t>
+              </a:r>
+            </a:p>
+          </p:txBody>
+        </p:sp>
+        <p:sp>
+          <p:nvSpPr>
+            <p:cNvPr id="16" name="TextBox 15">
+              <a:extLst>
+                <a:ext uri="{FF2B5EF4-FFF2-40B4-BE49-F238E27FC236}">
+                  <a16:creationId xmlns:a16="http://schemas.microsoft.com/office/drawing/2014/main" id="{690B47D7-4D46-4C75-AAA9-29A7D2B4AC18}"/>
+                </a:ext>
+              </a:extLst>
+            </p:cNvPr>
+            <p:cNvSpPr txBox="1"/>
+            <p:nvPr/>
+          </p:nvSpPr>
+          <p:spPr>
+            <a:xfrm>
+              <a:off x="3106243" y="1378648"/>
+              <a:ext cx="1322784" cy="200055"/>
+            </a:xfrm>
+            <a:prstGeom prst="rect">
+              <a:avLst/>
+            </a:prstGeom>
+            <a:noFill/>
+          </p:spPr>
+          <p:txBody>
+            <a:bodyPr wrap="square" rtlCol="0">
+              <a:spAutoFit/>
+            </a:bodyPr>
+            <a:lstStyle/>
+            <a:p>
+              <a:r>
+                <a:rPr lang="en-US" sz="700" dirty="0">
+                  <a:latin typeface="Arial" panose="020B0604020202020204" pitchFamily="34" charset="0"/>
+                  <a:cs typeface="Arial" panose="020B0604020202020204" pitchFamily="34" charset="0"/>
+                </a:rPr>
+                <a:t>Log Path</a:t>
+              </a:r>
+            </a:p>
+          </p:txBody>
+        </p:sp>
+        <p:grpSp>
+          <p:nvGrpSpPr>
+            <p:cNvPr id="51" name="Group 50">
+              <a:extLst>
+                <a:ext uri="{FF2B5EF4-FFF2-40B4-BE49-F238E27FC236}">
+                  <a16:creationId xmlns:a16="http://schemas.microsoft.com/office/drawing/2014/main" id="{E2FAB636-F6BA-42E0-AFA3-4F23A7F41F49}"/>
+                </a:ext>
+              </a:extLst>
+            </p:cNvPr>
+            <p:cNvGrpSpPr/>
+            <p:nvPr/>
+          </p:nvGrpSpPr>
+          <p:grpSpPr>
+            <a:xfrm>
+              <a:off x="5791035" y="1547732"/>
+              <a:ext cx="139147" cy="139147"/>
+              <a:chOff x="8119400" y="2874967"/>
+              <a:chExt cx="139147" cy="139147"/>
+            </a:xfrm>
+          </p:grpSpPr>
+          <p:sp>
+            <p:nvSpPr>
+              <p:cNvPr id="17" name="Rectangle: Rounded Corners 16">
+                <a:extLst>
+                  <a:ext uri="{FF2B5EF4-FFF2-40B4-BE49-F238E27FC236}">
+                    <a16:creationId xmlns:a16="http://schemas.microsoft.com/office/drawing/2014/main" id="{1ABDCD3D-E6A5-4885-BD38-B1110EEF1CAF}"/>
+                  </a:ext>
+                </a:extLst>
+              </p:cNvPr>
+              <p:cNvSpPr/>
+              <p:nvPr/>
+            </p:nvSpPr>
+            <p:spPr>
+              <a:xfrm>
+                <a:off x="8119400" y="2874967"/>
+                <a:ext cx="139147" cy="139147"/>
+              </a:xfrm>
+              <a:prstGeom prst="roundRect">
+                <a:avLst/>
+              </a:prstGeom>
+              <a:solidFill>
+                <a:srgbClr val="CCCCCC"/>
+              </a:solidFill>
+              <a:ln>
+                <a:solidFill>
+                  <a:srgbClr val="CCCCCC"/>
+                </a:solidFill>
+              </a:ln>
+            </p:spPr>
+            <p:style>
+              <a:lnRef idx="2">
+                <a:schemeClr val="accent1">
+                  <a:shade val="50000"/>
+                </a:schemeClr>
+              </a:lnRef>
+              <a:fillRef idx="1">
+                <a:schemeClr val="accent1"/>
+              </a:fillRef>
+              <a:effectRef idx="0">
+                <a:schemeClr val="accent1"/>
+              </a:effectRef>
+              <a:fontRef idx="minor">
+                <a:schemeClr val="lt1"/>
+              </a:fontRef>
+            </p:style>
+            <p:txBody>
+              <a:bodyPr rtlCol="0" anchor="ctr"/>
+              <a:lstStyle/>
+              <a:p>
+                <a:pPr algn="ctr"/>
+                <a:endParaRPr lang="en-US"/>
+              </a:p>
+            </p:txBody>
+          </p:sp>
+          <p:grpSp>
+            <p:nvGrpSpPr>
+              <p:cNvPr id="21" name="Group 20">
+                <a:extLst>
+                  <a:ext uri="{FF2B5EF4-FFF2-40B4-BE49-F238E27FC236}">
+                    <a16:creationId xmlns:a16="http://schemas.microsoft.com/office/drawing/2014/main" id="{F8E5B936-9AED-4332-8314-D1246F1D14F5}"/>
+                  </a:ext>
+                </a:extLst>
+              </p:cNvPr>
+              <p:cNvGrpSpPr/>
+              <p:nvPr/>
+            </p:nvGrpSpPr>
+            <p:grpSpPr>
+              <a:xfrm>
+                <a:off x="8137348" y="2972397"/>
+                <a:ext cx="103250" cy="18288"/>
+                <a:chOff x="6934200" y="2876550"/>
+                <a:chExt cx="103250" cy="18288"/>
+              </a:xfrm>
+            </p:grpSpPr>
+            <p:sp>
+              <p:nvSpPr>
+                <p:cNvPr id="18" name="Oval 17">
+                  <a:extLst>
+                    <a:ext uri="{FF2B5EF4-FFF2-40B4-BE49-F238E27FC236}">
+                      <a16:creationId xmlns:a16="http://schemas.microsoft.com/office/drawing/2014/main" id="{EB0452A2-4FEE-4FAE-A3D4-E3D9F19E6B6D}"/>
+                    </a:ext>
+                  </a:extLst>
+                </p:cNvPr>
+                <p:cNvSpPr>
+                  <a:spLocks noChangeAspect="1"/>
+                </p:cNvSpPr>
+                <p:nvPr/>
+              </p:nvSpPr>
+              <p:spPr>
+                <a:xfrm>
+                  <a:off x="6934200" y="2876550"/>
+                  <a:ext cx="18288" cy="18288"/>
+                </a:xfrm>
+                <a:prstGeom prst="ellipse">
+                  <a:avLst/>
+                </a:prstGeom>
+                <a:solidFill>
+                  <a:schemeClr val="bg2">
+                    <a:lumMod val="10000"/>
+                  </a:schemeClr>
+                </a:solidFill>
+                <a:ln>
+                  <a:noFill/>
+                </a:ln>
+              </p:spPr>
+              <p:style>
+                <a:lnRef idx="2">
+                  <a:schemeClr val="accent1">
+                    <a:shade val="50000"/>
+                  </a:schemeClr>
+                </a:lnRef>
+                <a:fillRef idx="1">
+                  <a:schemeClr val="accent1"/>
+                </a:fillRef>
+                <a:effectRef idx="0">
+                  <a:schemeClr val="accent1"/>
+                </a:effectRef>
+                <a:fontRef idx="minor">
+                  <a:schemeClr val="lt1"/>
+                </a:fontRef>
+              </p:style>
+              <p:txBody>
+                <a:bodyPr rtlCol="0" anchor="ctr"/>
+                <a:lstStyle/>
+                <a:p>
+                  <a:pPr algn="ctr"/>
+                  <a:endParaRPr lang="en-US"/>
+                </a:p>
+              </p:txBody>
+            </p:sp>
+            <p:sp>
+              <p:nvSpPr>
+                <p:cNvPr id="19" name="Oval 18">
+                  <a:extLst>
+                    <a:ext uri="{FF2B5EF4-FFF2-40B4-BE49-F238E27FC236}">
+                      <a16:creationId xmlns:a16="http://schemas.microsoft.com/office/drawing/2014/main" id="{743D958F-2F21-4E56-99C6-06EC47C3295F}"/>
+                    </a:ext>
+                  </a:extLst>
+                </p:cNvPr>
+                <p:cNvSpPr>
+                  <a:spLocks noChangeAspect="1"/>
+                </p:cNvSpPr>
+                <p:nvPr/>
+              </p:nvSpPr>
+              <p:spPr>
+                <a:xfrm>
+                  <a:off x="6974681" y="2876550"/>
+                  <a:ext cx="18288" cy="18288"/>
+                </a:xfrm>
+                <a:prstGeom prst="ellipse">
+                  <a:avLst/>
+                </a:prstGeom>
+                <a:solidFill>
+                  <a:schemeClr val="bg2">
+                    <a:lumMod val="10000"/>
+                  </a:schemeClr>
+                </a:solidFill>
+                <a:ln>
+                  <a:noFill/>
+                </a:ln>
+              </p:spPr>
+              <p:style>
+                <a:lnRef idx="2">
+                  <a:schemeClr val="accent1">
+                    <a:shade val="50000"/>
+                  </a:schemeClr>
+                </a:lnRef>
+                <a:fillRef idx="1">
+                  <a:schemeClr val="accent1"/>
+                </a:fillRef>
+                <a:effectRef idx="0">
+                  <a:schemeClr val="accent1"/>
+                </a:effectRef>
+                <a:fontRef idx="minor">
+                  <a:schemeClr val="lt1"/>
+                </a:fontRef>
+              </p:style>
+              <p:txBody>
+                <a:bodyPr rtlCol="0" anchor="ctr"/>
+                <a:lstStyle/>
+                <a:p>
+                  <a:pPr algn="ctr"/>
+                  <a:endParaRPr lang="en-US"/>
+                </a:p>
+              </p:txBody>
+            </p:sp>
+            <p:sp>
+              <p:nvSpPr>
+                <p:cNvPr id="20" name="Oval 19">
+                  <a:extLst>
+                    <a:ext uri="{FF2B5EF4-FFF2-40B4-BE49-F238E27FC236}">
+                      <a16:creationId xmlns:a16="http://schemas.microsoft.com/office/drawing/2014/main" id="{CF512E2B-E3E8-4197-A52C-02E5FE1DE216}"/>
+                    </a:ext>
+                  </a:extLst>
+                </p:cNvPr>
+                <p:cNvSpPr>
+                  <a:spLocks noChangeAspect="1"/>
+                </p:cNvSpPr>
+                <p:nvPr/>
+              </p:nvSpPr>
+              <p:spPr>
+                <a:xfrm>
+                  <a:off x="7019162" y="2876550"/>
+                  <a:ext cx="18288" cy="18288"/>
+                </a:xfrm>
+                <a:prstGeom prst="ellipse">
+                  <a:avLst/>
+                </a:prstGeom>
+                <a:solidFill>
+                  <a:schemeClr val="bg2">
+                    <a:lumMod val="10000"/>
+                  </a:schemeClr>
+                </a:solidFill>
+                <a:ln>
+                  <a:noFill/>
+                </a:ln>
+              </p:spPr>
+              <p:style>
+                <a:lnRef idx="2">
+                  <a:schemeClr val="accent1">
+                    <a:shade val="50000"/>
+                  </a:schemeClr>
+                </a:lnRef>
+                <a:fillRef idx="1">
+                  <a:schemeClr val="accent1"/>
+                </a:fillRef>
+                <a:effectRef idx="0">
+                  <a:schemeClr val="accent1"/>
+                </a:effectRef>
+                <a:fontRef idx="minor">
+                  <a:schemeClr val="lt1"/>
+                </a:fontRef>
+              </p:style>
+              <p:txBody>
+                <a:bodyPr rtlCol="0" anchor="ctr"/>
+                <a:lstStyle/>
+                <a:p>
+                  <a:pPr algn="ctr"/>
+                  <a:endParaRPr lang="en-US"/>
+                </a:p>
+              </p:txBody>
+            </p:sp>
+          </p:grpSp>
+        </p:grpSp>
+        <p:sp>
+          <p:nvSpPr>
+            <p:cNvPr id="22" name="Rectangle 21">
+              <a:extLst>
+                <a:ext uri="{FF2B5EF4-FFF2-40B4-BE49-F238E27FC236}">
+                  <a16:creationId xmlns:a16="http://schemas.microsoft.com/office/drawing/2014/main" id="{BE1BEB08-CAAB-4FE2-AB43-7CD19BA2C9AD}"/>
+                </a:ext>
+              </a:extLst>
+            </p:cNvPr>
+            <p:cNvSpPr/>
+            <p:nvPr/>
+          </p:nvSpPr>
+          <p:spPr>
+            <a:xfrm>
+              <a:off x="3212803" y="1863340"/>
+              <a:ext cx="2471738" cy="139147"/>
+            </a:xfrm>
+            <a:prstGeom prst="rect">
+              <a:avLst/>
+            </a:prstGeom>
+            <a:noFill/>
+            <a:ln>
+              <a:solidFill>
+                <a:srgbClr val="CCCCCC"/>
+              </a:solidFill>
+            </a:ln>
+          </p:spPr>
+          <p:style>
+            <a:lnRef idx="2">
+              <a:schemeClr val="accent1">
+                <a:shade val="50000"/>
+              </a:schemeClr>
+            </a:lnRef>
+            <a:fillRef idx="1">
+              <a:schemeClr val="accent1"/>
+            </a:fillRef>
+            <a:effectRef idx="0">
+              <a:schemeClr val="accent1"/>
+            </a:effectRef>
+            <a:fontRef idx="minor">
+              <a:schemeClr val="lt1"/>
+            </a:fontRef>
+          </p:style>
+          <p:txBody>
+            <a:bodyPr rtlCol="0" anchor="ctr"/>
+            <a:lstStyle/>
+            <a:p>
+              <a:r>
+                <a:rPr lang="en-US" sz="700" i="1" dirty="0">
+                  <a:solidFill>
+                    <a:schemeClr val="bg1">
+                      <a:lumMod val="50000"/>
+                    </a:schemeClr>
+                  </a:solidFill>
+                </a:rPr>
+                <a:t>&lt;enter a project name&gt; (required)</a:t>
+              </a:r>
+            </a:p>
+          </p:txBody>
+        </p:sp>
+        <p:sp>
+          <p:nvSpPr>
+            <p:cNvPr id="23" name="TextBox 22">
+              <a:extLst>
+                <a:ext uri="{FF2B5EF4-FFF2-40B4-BE49-F238E27FC236}">
+                  <a16:creationId xmlns:a16="http://schemas.microsoft.com/office/drawing/2014/main" id="{F85A910C-A2AF-4A7F-810E-865A55858348}"/>
+                </a:ext>
+              </a:extLst>
+            </p:cNvPr>
+            <p:cNvSpPr txBox="1"/>
+            <p:nvPr/>
+          </p:nvSpPr>
+          <p:spPr>
+            <a:xfrm>
+              <a:off x="3106243" y="1694256"/>
+              <a:ext cx="1322784" cy="200055"/>
+            </a:xfrm>
+            <a:prstGeom prst="rect">
+              <a:avLst/>
+            </a:prstGeom>
+            <a:noFill/>
+          </p:spPr>
+          <p:txBody>
+            <a:bodyPr wrap="square" rtlCol="0">
+              <a:spAutoFit/>
+            </a:bodyPr>
+            <a:lstStyle/>
+            <a:p>
+              <a:r>
+                <a:rPr lang="en-US" sz="700" dirty="0">
+                  <a:latin typeface="Arial" panose="020B0604020202020204" pitchFamily="34" charset="0"/>
+                  <a:cs typeface="Arial" panose="020B0604020202020204" pitchFamily="34" charset="0"/>
+                </a:rPr>
+                <a:t>Project Name</a:t>
+              </a:r>
+            </a:p>
+          </p:txBody>
+        </p:sp>
+        <p:sp>
+          <p:nvSpPr>
+            <p:cNvPr id="24" name="Rectangle 23">
+              <a:extLst>
+                <a:ext uri="{FF2B5EF4-FFF2-40B4-BE49-F238E27FC236}">
+                  <a16:creationId xmlns:a16="http://schemas.microsoft.com/office/drawing/2014/main" id="{0B1D2322-04CE-46A5-ABE6-103E3B81FD7E}"/>
+                </a:ext>
+              </a:extLst>
+            </p:cNvPr>
+            <p:cNvSpPr/>
+            <p:nvPr/>
+          </p:nvSpPr>
+          <p:spPr>
+            <a:xfrm>
+              <a:off x="3212803" y="2178237"/>
+              <a:ext cx="2471738" cy="139147"/>
+            </a:xfrm>
+            <a:prstGeom prst="rect">
+              <a:avLst/>
+            </a:prstGeom>
+            <a:noFill/>
+            <a:ln>
+              <a:solidFill>
+                <a:srgbClr val="CCCCCC"/>
+              </a:solidFill>
+            </a:ln>
+          </p:spPr>
+          <p:style>
+            <a:lnRef idx="2">
+              <a:schemeClr val="accent1">
+                <a:shade val="50000"/>
+              </a:schemeClr>
+            </a:lnRef>
+            <a:fillRef idx="1">
+              <a:schemeClr val="accent1"/>
+            </a:fillRef>
+            <a:effectRef idx="0">
+              <a:schemeClr val="accent1"/>
+            </a:effectRef>
+            <a:fontRef idx="minor">
+              <a:schemeClr val="lt1"/>
+            </a:fontRef>
+          </p:style>
+          <p:txBody>
+            <a:bodyPr rtlCol="0" anchor="ctr"/>
+            <a:lstStyle/>
+            <a:p>
+              <a:r>
+                <a:rPr lang="en-US" sz="700" i="1" dirty="0">
+                  <a:solidFill>
+                    <a:schemeClr val="bg1">
+                      <a:lumMod val="50000"/>
+                    </a:schemeClr>
+                  </a:solidFill>
+                </a:rPr>
+                <a:t>&lt;enter a project number&gt; (required)</a:t>
+              </a:r>
+            </a:p>
+          </p:txBody>
+        </p:sp>
+        <p:sp>
+          <p:nvSpPr>
+            <p:cNvPr id="25" name="TextBox 24">
+              <a:extLst>
+                <a:ext uri="{FF2B5EF4-FFF2-40B4-BE49-F238E27FC236}">
+                  <a16:creationId xmlns:a16="http://schemas.microsoft.com/office/drawing/2014/main" id="{D4C13995-FE80-47CE-A2E3-531D59687460}"/>
+                </a:ext>
+              </a:extLst>
+            </p:cNvPr>
+            <p:cNvSpPr txBox="1"/>
+            <p:nvPr/>
+          </p:nvSpPr>
+          <p:spPr>
+            <a:xfrm>
+              <a:off x="3106243" y="2009153"/>
+              <a:ext cx="1322784" cy="200055"/>
+            </a:xfrm>
+            <a:prstGeom prst="rect">
+              <a:avLst/>
+            </a:prstGeom>
+            <a:noFill/>
+          </p:spPr>
+          <p:txBody>
+            <a:bodyPr wrap="square" rtlCol="0">
+              <a:spAutoFit/>
+            </a:bodyPr>
+            <a:lstStyle/>
+            <a:p>
+              <a:r>
+                <a:rPr lang="en-US" sz="700" dirty="0">
+                  <a:latin typeface="Arial" panose="020B0604020202020204" pitchFamily="34" charset="0"/>
+                  <a:cs typeface="Arial" panose="020B0604020202020204" pitchFamily="34" charset="0"/>
+                </a:rPr>
+                <a:t>Project Number</a:t>
+              </a:r>
+            </a:p>
+          </p:txBody>
+        </p:sp>
+        <p:sp>
+          <p:nvSpPr>
+            <p:cNvPr id="47" name="Rectangle: Rounded Corners 46">
+              <a:extLst>
+                <a:ext uri="{FF2B5EF4-FFF2-40B4-BE49-F238E27FC236}">
+                  <a16:creationId xmlns:a16="http://schemas.microsoft.com/office/drawing/2014/main" id="{CC2A1B43-8870-48DF-BE79-27F86DBA530F}"/>
+                </a:ext>
+              </a:extLst>
+            </p:cNvPr>
+            <p:cNvSpPr/>
+            <p:nvPr/>
+          </p:nvSpPr>
+          <p:spPr>
+            <a:xfrm>
+              <a:off x="3086365" y="1126317"/>
+              <a:ext cx="2999780" cy="1661461"/>
+            </a:xfrm>
+            <a:prstGeom prst="roundRect">
+              <a:avLst>
+                <a:gd name="adj" fmla="val 5201"/>
+              </a:avLst>
+            </a:prstGeom>
+            <a:noFill/>
+            <a:ln>
+              <a:solidFill>
+                <a:srgbClr val="333F50"/>
+              </a:solidFill>
+            </a:ln>
+          </p:spPr>
+          <p:style>
+            <a:lnRef idx="2">
+              <a:schemeClr val="accent1">
+                <a:shade val="50000"/>
+              </a:schemeClr>
+            </a:lnRef>
+            <a:fillRef idx="1">
+              <a:schemeClr val="accent1"/>
+            </a:fillRef>
+            <a:effectRef idx="0">
+              <a:schemeClr val="accent1"/>
+            </a:effectRef>
+            <a:fontRef idx="minor">
+              <a:schemeClr val="lt1"/>
+            </a:fontRef>
+          </p:style>
+          <p:txBody>
+            <a:bodyPr rtlCol="0" anchor="ctr"/>
+            <a:lstStyle/>
+            <a:p>
+              <a:pPr algn="ctr"/>
+              <a:endParaRPr lang="en-US" dirty="0"/>
+            </a:p>
+          </p:txBody>
+        </p:sp>
+        <p:sp>
+          <p:nvSpPr>
+            <p:cNvPr id="50" name="TextBox 49">
+              <a:extLst>
+                <a:ext uri="{FF2B5EF4-FFF2-40B4-BE49-F238E27FC236}">
+                  <a16:creationId xmlns:a16="http://schemas.microsoft.com/office/drawing/2014/main" id="{135EACD4-B365-4192-AE21-D72DA07BBDBC}"/>
+                </a:ext>
+              </a:extLst>
+            </p:cNvPr>
+            <p:cNvSpPr txBox="1"/>
+            <p:nvPr/>
+          </p:nvSpPr>
+          <p:spPr>
+            <a:xfrm>
+              <a:off x="3117440" y="1202898"/>
+              <a:ext cx="1322784" cy="200055"/>
+            </a:xfrm>
+            <a:prstGeom prst="rect">
+              <a:avLst/>
+            </a:prstGeom>
+            <a:noFill/>
+          </p:spPr>
+          <p:txBody>
+            <a:bodyPr wrap="square" rtlCol="0">
+              <a:spAutoFit/>
+            </a:bodyPr>
+            <a:lstStyle/>
+            <a:p>
+              <a:r>
+                <a:rPr lang="en-US" sz="700" dirty="0">
+                  <a:latin typeface="Arial" panose="020B0604020202020204" pitchFamily="34" charset="0"/>
+                  <a:cs typeface="Arial" panose="020B0604020202020204" pitchFamily="34" charset="0"/>
+                </a:rPr>
+                <a:t>Details</a:t>
+              </a:r>
+            </a:p>
+          </p:txBody>
+        </p:sp>
+        <p:grpSp>
+          <p:nvGrpSpPr>
+            <p:cNvPr id="145" name="Group 144">
+              <a:extLst>
+                <a:ext uri="{FF2B5EF4-FFF2-40B4-BE49-F238E27FC236}">
+                  <a16:creationId xmlns:a16="http://schemas.microsoft.com/office/drawing/2014/main" id="{F114FF77-ADD7-4E74-AA06-6F14491DF324}"/>
+                </a:ext>
+              </a:extLst>
+            </p:cNvPr>
+            <p:cNvGrpSpPr/>
+            <p:nvPr/>
+          </p:nvGrpSpPr>
+          <p:grpSpPr>
+            <a:xfrm>
+              <a:off x="3086365" y="2991402"/>
+              <a:ext cx="3015459" cy="1429618"/>
+              <a:chOff x="3086365" y="2602490"/>
+              <a:chExt cx="3015459" cy="1429618"/>
+            </a:xfrm>
+          </p:grpSpPr>
+          <p:grpSp>
+            <p:nvGrpSpPr>
+              <p:cNvPr id="39" name="Group 38">
+                <a:extLst>
+                  <a:ext uri="{FF2B5EF4-FFF2-40B4-BE49-F238E27FC236}">
+                    <a16:creationId xmlns:a16="http://schemas.microsoft.com/office/drawing/2014/main" id="{E38E7810-8636-4872-A774-CA129A15AE33}"/>
+                  </a:ext>
+                </a:extLst>
+              </p:cNvPr>
+              <p:cNvGrpSpPr/>
+              <p:nvPr/>
+            </p:nvGrpSpPr>
+            <p:grpSpPr>
+              <a:xfrm>
+                <a:off x="3227451" y="2825410"/>
+                <a:ext cx="2728204" cy="803317"/>
+                <a:chOff x="5544619" y="3568658"/>
+                <a:chExt cx="2728204" cy="803317"/>
+              </a:xfrm>
+            </p:grpSpPr>
+            <p:sp>
+              <p:nvSpPr>
+                <p:cNvPr id="29" name="Oval 28">
+                  <a:extLst>
+                    <a:ext uri="{FF2B5EF4-FFF2-40B4-BE49-F238E27FC236}">
+                      <a16:creationId xmlns:a16="http://schemas.microsoft.com/office/drawing/2014/main" id="{28A6F950-B78B-4A38-8F80-B67053E62096}"/>
+                    </a:ext>
+                  </a:extLst>
+                </p:cNvPr>
+                <p:cNvSpPr>
+                  <a:spLocks noChangeAspect="1"/>
+                </p:cNvSpPr>
+                <p:nvPr/>
+              </p:nvSpPr>
+              <p:spPr>
+                <a:xfrm>
+                  <a:off x="5544619" y="3635196"/>
+                  <a:ext cx="73152" cy="73152"/>
+                </a:xfrm>
+                <a:prstGeom prst="ellipse">
+                  <a:avLst/>
+                </a:prstGeom>
+                <a:noFill/>
+              </p:spPr>
+              <p:style>
+                <a:lnRef idx="2">
+                  <a:schemeClr val="dk1">
+                    <a:shade val="50000"/>
+                  </a:schemeClr>
+                </a:lnRef>
+                <a:fillRef idx="1">
+                  <a:schemeClr val="dk1"/>
+                </a:fillRef>
+                <a:effectRef idx="0">
+                  <a:schemeClr val="dk1"/>
+                </a:effectRef>
+                <a:fontRef idx="minor">
+                  <a:schemeClr val="lt1"/>
+                </a:fontRef>
+              </p:style>
+              <p:txBody>
+                <a:bodyPr rtlCol="0" anchor="ctr"/>
+                <a:lstStyle/>
+                <a:p>
+                  <a:pPr algn="ctr"/>
+                  <a:endParaRPr lang="en-US"/>
+                </a:p>
+              </p:txBody>
+            </p:sp>
+            <p:sp>
+              <p:nvSpPr>
+                <p:cNvPr id="30" name="TextBox 29">
+                  <a:extLst>
+                    <a:ext uri="{FF2B5EF4-FFF2-40B4-BE49-F238E27FC236}">
+                      <a16:creationId xmlns:a16="http://schemas.microsoft.com/office/drawing/2014/main" id="{0BFB12C1-0D30-498E-8641-411B47201DCC}"/>
+                    </a:ext>
+                  </a:extLst>
+                </p:cNvPr>
+                <p:cNvSpPr txBox="1"/>
+                <p:nvPr/>
+              </p:nvSpPr>
+              <p:spPr>
+                <a:xfrm>
+                  <a:off x="5591536" y="3568658"/>
+                  <a:ext cx="283772" cy="200055"/>
+                </a:xfrm>
+                <a:prstGeom prst="rect">
+                  <a:avLst/>
+                </a:prstGeom>
+                <a:noFill/>
+              </p:spPr>
+              <p:txBody>
+                <a:bodyPr wrap="square" rtlCol="0">
+                  <a:spAutoFit/>
+                </a:bodyPr>
+                <a:lstStyle/>
+                <a:p>
+                  <a:r>
+                    <a:rPr lang="en-US" sz="700" dirty="0">
+                      <a:latin typeface="Arial" panose="020B0604020202020204" pitchFamily="34" charset="0"/>
+                      <a:cs typeface="Arial" panose="020B0604020202020204" pitchFamily="34" charset="0"/>
+                    </a:rPr>
+                    <a:t>All</a:t>
+                  </a:r>
+                </a:p>
+              </p:txBody>
+            </p:sp>
+            <p:sp>
+              <p:nvSpPr>
+                <p:cNvPr id="32" name="Oval 31">
+                  <a:extLst>
+                    <a:ext uri="{FF2B5EF4-FFF2-40B4-BE49-F238E27FC236}">
+                      <a16:creationId xmlns:a16="http://schemas.microsoft.com/office/drawing/2014/main" id="{CA04F35F-C0E8-4CCC-B2EE-98BC0FC9A312}"/>
+                    </a:ext>
+                  </a:extLst>
+                </p:cNvPr>
+                <p:cNvSpPr>
+                  <a:spLocks noChangeAspect="1"/>
+                </p:cNvSpPr>
+                <p:nvPr/>
+              </p:nvSpPr>
+              <p:spPr>
+                <a:xfrm>
+                  <a:off x="5892713" y="3635196"/>
+                  <a:ext cx="73152" cy="73152"/>
+                </a:xfrm>
+                <a:prstGeom prst="ellipse">
+                  <a:avLst/>
+                </a:prstGeom>
+                <a:noFill/>
+              </p:spPr>
+              <p:style>
+                <a:lnRef idx="2">
+                  <a:schemeClr val="dk1">
+                    <a:shade val="50000"/>
+                  </a:schemeClr>
+                </a:lnRef>
+                <a:fillRef idx="1">
+                  <a:schemeClr val="dk1"/>
+                </a:fillRef>
+                <a:effectRef idx="0">
+                  <a:schemeClr val="dk1"/>
+                </a:effectRef>
+                <a:fontRef idx="minor">
+                  <a:schemeClr val="lt1"/>
+                </a:fontRef>
+              </p:style>
+              <p:txBody>
+                <a:bodyPr rtlCol="0" anchor="ctr"/>
+                <a:lstStyle/>
+                <a:p>
+                  <a:pPr algn="ctr"/>
+                  <a:endParaRPr lang="en-US"/>
+                </a:p>
+              </p:txBody>
+            </p:sp>
+            <p:sp>
+              <p:nvSpPr>
+                <p:cNvPr id="33" name="TextBox 32">
+                  <a:extLst>
+                    <a:ext uri="{FF2B5EF4-FFF2-40B4-BE49-F238E27FC236}">
+                      <a16:creationId xmlns:a16="http://schemas.microsoft.com/office/drawing/2014/main" id="{E34738C4-1932-4936-830C-0B6540FA6398}"/>
+                    </a:ext>
+                  </a:extLst>
+                </p:cNvPr>
+                <p:cNvSpPr txBox="1"/>
+                <p:nvPr/>
+              </p:nvSpPr>
+              <p:spPr>
+                <a:xfrm>
+                  <a:off x="5939630" y="3568658"/>
+                  <a:ext cx="894549" cy="200055"/>
+                </a:xfrm>
+                <a:prstGeom prst="rect">
+                  <a:avLst/>
+                </a:prstGeom>
+                <a:noFill/>
+              </p:spPr>
+              <p:txBody>
+                <a:bodyPr wrap="square" rtlCol="0">
+                  <a:spAutoFit/>
+                </a:bodyPr>
+                <a:lstStyle/>
+                <a:p>
+                  <a:r>
+                    <a:rPr lang="en-US" sz="700" dirty="0">
+                      <a:latin typeface="Arial" panose="020B0604020202020204" pitchFamily="34" charset="0"/>
+                      <a:cs typeface="Arial" panose="020B0604020202020204" pitchFamily="34" charset="0"/>
+                    </a:rPr>
+                    <a:t>Model Categories</a:t>
+                  </a:r>
+                </a:p>
+              </p:txBody>
+            </p:sp>
+            <p:sp>
+              <p:nvSpPr>
+                <p:cNvPr id="34" name="Oval 33">
+                  <a:extLst>
+                    <a:ext uri="{FF2B5EF4-FFF2-40B4-BE49-F238E27FC236}">
+                      <a16:creationId xmlns:a16="http://schemas.microsoft.com/office/drawing/2014/main" id="{E3A662EE-15F3-4020-BF87-59C8D0A02345}"/>
+                    </a:ext>
+                  </a:extLst>
+                </p:cNvPr>
+                <p:cNvSpPr>
+                  <a:spLocks noChangeAspect="1"/>
+                </p:cNvSpPr>
+                <p:nvPr/>
+              </p:nvSpPr>
+              <p:spPr>
+                <a:xfrm>
+                  <a:off x="6883981" y="3635196"/>
+                  <a:ext cx="73152" cy="73152"/>
+                </a:xfrm>
+                <a:prstGeom prst="ellipse">
+                  <a:avLst/>
+                </a:prstGeom>
+                <a:noFill/>
+              </p:spPr>
+              <p:style>
+                <a:lnRef idx="2">
+                  <a:schemeClr val="dk1">
+                    <a:shade val="50000"/>
+                  </a:schemeClr>
+                </a:lnRef>
+                <a:fillRef idx="1">
+                  <a:schemeClr val="dk1"/>
+                </a:fillRef>
+                <a:effectRef idx="0">
+                  <a:schemeClr val="dk1"/>
+                </a:effectRef>
+                <a:fontRef idx="minor">
+                  <a:schemeClr val="lt1"/>
+                </a:fontRef>
+              </p:style>
+              <p:txBody>
+                <a:bodyPr rtlCol="0" anchor="ctr"/>
+                <a:lstStyle/>
+                <a:p>
+                  <a:pPr algn="ctr"/>
+                  <a:endParaRPr lang="en-US"/>
+                </a:p>
+              </p:txBody>
+            </p:sp>
+            <p:sp>
+              <p:nvSpPr>
+                <p:cNvPr id="35" name="TextBox 34">
+                  <a:extLst>
+                    <a:ext uri="{FF2B5EF4-FFF2-40B4-BE49-F238E27FC236}">
+                      <a16:creationId xmlns:a16="http://schemas.microsoft.com/office/drawing/2014/main" id="{B63754C7-05B2-4F1F-BEB3-EC5FB40B6008}"/>
+                    </a:ext>
+                  </a:extLst>
+                </p:cNvPr>
+                <p:cNvSpPr txBox="1"/>
+                <p:nvPr/>
+              </p:nvSpPr>
+              <p:spPr>
+                <a:xfrm>
+                  <a:off x="6930898" y="3568658"/>
+                  <a:ext cx="1103440" cy="200055"/>
+                </a:xfrm>
+                <a:prstGeom prst="rect">
+                  <a:avLst/>
+                </a:prstGeom>
+                <a:noFill/>
+              </p:spPr>
+              <p:txBody>
+                <a:bodyPr wrap="square" rtlCol="0">
+                  <a:spAutoFit/>
+                </a:bodyPr>
+                <a:lstStyle/>
+                <a:p>
+                  <a:r>
+                    <a:rPr lang="en-US" sz="700" dirty="0">
+                      <a:latin typeface="Arial" panose="020B0604020202020204" pitchFamily="34" charset="0"/>
+                      <a:cs typeface="Arial" panose="020B0604020202020204" pitchFamily="34" charset="0"/>
+                    </a:rPr>
+                    <a:t>Annotation Categories</a:t>
+                  </a:r>
+                </a:p>
+              </p:txBody>
+            </p:sp>
+            <p:sp>
+              <p:nvSpPr>
+                <p:cNvPr id="36" name="Rectangle 35">
+                  <a:extLst>
+                    <a:ext uri="{FF2B5EF4-FFF2-40B4-BE49-F238E27FC236}">
+                      <a16:creationId xmlns:a16="http://schemas.microsoft.com/office/drawing/2014/main" id="{BE949E28-1936-4FC9-BF3B-B3958A5C271C}"/>
+                    </a:ext>
+                  </a:extLst>
+                </p:cNvPr>
+                <p:cNvSpPr/>
+                <p:nvPr/>
+              </p:nvSpPr>
+              <p:spPr>
+                <a:xfrm>
+                  <a:off x="5555816" y="3768713"/>
+                  <a:ext cx="2717007" cy="603262"/>
+                </a:xfrm>
+                <a:prstGeom prst="rect">
+                  <a:avLst/>
+                </a:prstGeom>
+                <a:noFill/>
+                <a:ln>
+                  <a:solidFill>
+                    <a:srgbClr val="CCCCCC"/>
+                  </a:solidFill>
+                </a:ln>
+              </p:spPr>
+              <p:style>
+                <a:lnRef idx="2">
+                  <a:schemeClr val="accent1">
+                    <a:shade val="50000"/>
+                  </a:schemeClr>
+                </a:lnRef>
+                <a:fillRef idx="1">
+                  <a:schemeClr val="accent1"/>
+                </a:fillRef>
+                <a:effectRef idx="0">
+                  <a:schemeClr val="accent1"/>
+                </a:effectRef>
+                <a:fontRef idx="minor">
+                  <a:schemeClr val="lt1"/>
+                </a:fontRef>
+              </p:style>
+              <p:txBody>
+                <a:bodyPr rtlCol="0" anchor="t"/>
+                <a:lstStyle/>
+                <a:p>
+                  <a:r>
+                    <a:rPr lang="en-US" sz="600" i="1" dirty="0" err="1">
+                      <a:solidFill>
+                        <a:schemeClr val="bg1">
+                          <a:lumMod val="50000"/>
+                        </a:schemeClr>
+                      </a:solidFill>
+                      <a:latin typeface="Arial" panose="020B0604020202020204" pitchFamily="34" charset="0"/>
+                      <a:cs typeface="Arial" panose="020B0604020202020204" pitchFamily="34" charset="0"/>
+                    </a:rPr>
+                    <a:t>Columns;Ducts;Grids</a:t>
+                  </a:r>
+                  <a:r>
+                    <a:rPr lang="en-US" sz="600" i="1" dirty="0">
+                      <a:solidFill>
+                        <a:schemeClr val="bg1">
+                          <a:lumMod val="50000"/>
+                        </a:schemeClr>
+                      </a:solidFill>
+                      <a:latin typeface="Arial" panose="020B0604020202020204" pitchFamily="34" charset="0"/>
+                      <a:cs typeface="Arial" panose="020B0604020202020204" pitchFamily="34" charset="0"/>
+                    </a:rPr>
+                    <a:t> </a:t>
+                  </a:r>
+                  <a:endParaRPr lang="en-US" sz="500" i="1" dirty="0">
+                    <a:solidFill>
+                      <a:schemeClr val="bg1">
+                        <a:lumMod val="50000"/>
+                      </a:schemeClr>
+                    </a:solidFill>
+                    <a:latin typeface="Arial" panose="020B0604020202020204" pitchFamily="34" charset="0"/>
+                    <a:cs typeface="Arial" panose="020B0604020202020204" pitchFamily="34" charset="0"/>
+                  </a:endParaRPr>
+                </a:p>
+              </p:txBody>
+            </p:sp>
+          </p:grpSp>
+          <p:sp>
+            <p:nvSpPr>
+              <p:cNvPr id="37" name="Rectangle: Rounded Corners 36">
+                <a:hlinkClick r:id="" action="ppaction://hlinkshowjump?jump=nextslide"/>
+                <a:extLst>
+                  <a:ext uri="{FF2B5EF4-FFF2-40B4-BE49-F238E27FC236}">
+                    <a16:creationId xmlns:a16="http://schemas.microsoft.com/office/drawing/2014/main" id="{7BFBA77C-4E39-429F-8341-26DE9BA6E2C4}"/>
+                  </a:ext>
+                </a:extLst>
+              </p:cNvPr>
+              <p:cNvSpPr/>
+              <p:nvPr/>
+            </p:nvSpPr>
+            <p:spPr>
+              <a:xfrm>
+                <a:off x="5480246" y="3831716"/>
+                <a:ext cx="621578" cy="200392"/>
+              </a:xfrm>
+              <a:prstGeom prst="roundRect">
+                <a:avLst/>
+              </a:prstGeom>
+              <a:noFill/>
+              <a:ln>
+                <a:solidFill>
+                  <a:srgbClr val="FF522F"/>
+                </a:solidFill>
+              </a:ln>
+            </p:spPr>
+            <p:style>
+              <a:lnRef idx="2">
+                <a:schemeClr val="accent1">
+                  <a:shade val="50000"/>
+                </a:schemeClr>
+              </a:lnRef>
+              <a:fillRef idx="1">
+                <a:schemeClr val="accent1"/>
+              </a:fillRef>
+              <a:effectRef idx="0">
+                <a:schemeClr val="accent1"/>
+              </a:effectRef>
+              <a:fontRef idx="minor">
+                <a:schemeClr val="lt1"/>
+              </a:fontRef>
+            </p:style>
+            <p:txBody>
+              <a:bodyPr rtlCol="0" anchor="ctr"/>
+              <a:lstStyle/>
+              <a:p>
+                <a:pPr algn="ctr"/>
+                <a:r>
+                  <a:rPr lang="en-US" sz="900" dirty="0">
+                    <a:solidFill>
+                      <a:schemeClr val="tx1"/>
+                    </a:solidFill>
+                  </a:rPr>
+                  <a:t>Save</a:t>
+                </a:r>
+              </a:p>
+            </p:txBody>
+          </p:sp>
+          <p:sp>
+            <p:nvSpPr>
+              <p:cNvPr id="38" name="Rectangle: Rounded Corners 37">
+                <a:hlinkClick r:id="" action="ppaction://hlinkshowjump?jump=nextslide"/>
+                <a:extLst>
+                  <a:ext uri="{FF2B5EF4-FFF2-40B4-BE49-F238E27FC236}">
+                    <a16:creationId xmlns:a16="http://schemas.microsoft.com/office/drawing/2014/main" id="{CCC65F0D-2533-49ED-B32F-3D1959E089E8}"/>
+                  </a:ext>
+                </a:extLst>
+              </p:cNvPr>
+              <p:cNvSpPr/>
+              <p:nvPr/>
+            </p:nvSpPr>
+            <p:spPr>
+              <a:xfrm>
+                <a:off x="3227451" y="3831716"/>
+                <a:ext cx="973572" cy="200392"/>
+              </a:xfrm>
+              <a:prstGeom prst="roundRect">
+                <a:avLst/>
+              </a:prstGeom>
+              <a:noFill/>
+              <a:ln>
+                <a:solidFill>
+                  <a:srgbClr val="00B0F0"/>
+                </a:solidFill>
+              </a:ln>
+            </p:spPr>
+            <p:style>
+              <a:lnRef idx="2">
+                <a:schemeClr val="accent1">
+                  <a:shade val="50000"/>
+                </a:schemeClr>
+              </a:lnRef>
+              <a:fillRef idx="1">
+                <a:schemeClr val="accent1"/>
+              </a:fillRef>
+              <a:effectRef idx="0">
+                <a:schemeClr val="accent1"/>
+              </a:effectRef>
+              <a:fontRef idx="minor">
+                <a:schemeClr val="lt1"/>
+              </a:fontRef>
+            </p:style>
+            <p:txBody>
+              <a:bodyPr rtlCol="0" anchor="ctr"/>
+              <a:lstStyle/>
+              <a:p>
+                <a:pPr algn="ctr"/>
+                <a:r>
+                  <a:rPr lang="en-US" sz="900" dirty="0">
+                    <a:solidFill>
+                      <a:schemeClr val="tx1"/>
+                    </a:solidFill>
+                  </a:rPr>
+                  <a:t>Import Settings</a:t>
+                </a:r>
+              </a:p>
+            </p:txBody>
+          </p:sp>
+          <p:sp>
+            <p:nvSpPr>
+              <p:cNvPr id="40" name="TextBox 39">
+                <a:extLst>
+                  <a:ext uri="{FF2B5EF4-FFF2-40B4-BE49-F238E27FC236}">
+                    <a16:creationId xmlns:a16="http://schemas.microsoft.com/office/drawing/2014/main" id="{D0822B2E-DD67-4AAF-BE7D-CEC27B5406EA}"/>
+                  </a:ext>
+                </a:extLst>
+              </p:cNvPr>
+              <p:cNvSpPr txBox="1"/>
+              <p:nvPr/>
+            </p:nvSpPr>
+            <p:spPr>
+              <a:xfrm>
+                <a:off x="3117440" y="2656862"/>
+                <a:ext cx="1322784" cy="200055"/>
+              </a:xfrm>
+              <a:prstGeom prst="rect">
+                <a:avLst/>
+              </a:prstGeom>
+              <a:noFill/>
+            </p:spPr>
+            <p:txBody>
+              <a:bodyPr wrap="square" rtlCol="0">
+                <a:spAutoFit/>
+              </a:bodyPr>
+              <a:lstStyle/>
+              <a:p>
+                <a:r>
+                  <a:rPr lang="en-US" sz="700" dirty="0">
+                    <a:latin typeface="Arial" panose="020B0604020202020204" pitchFamily="34" charset="0"/>
+                    <a:cs typeface="Arial" panose="020B0604020202020204" pitchFamily="34" charset="0"/>
+                  </a:rPr>
+                  <a:t>Scope</a:t>
+                </a:r>
+              </a:p>
+            </p:txBody>
+          </p:sp>
+          <p:sp>
+            <p:nvSpPr>
+              <p:cNvPr id="49" name="Rectangle: Rounded Corners 48">
+                <a:extLst>
+                  <a:ext uri="{FF2B5EF4-FFF2-40B4-BE49-F238E27FC236}">
+                    <a16:creationId xmlns:a16="http://schemas.microsoft.com/office/drawing/2014/main" id="{ACBE481D-1094-4DF7-8CCA-DDCC7B19040A}"/>
+                  </a:ext>
+                </a:extLst>
+              </p:cNvPr>
+              <p:cNvSpPr/>
+              <p:nvPr/>
+            </p:nvSpPr>
+            <p:spPr>
+              <a:xfrm>
+                <a:off x="3086365" y="2602490"/>
+                <a:ext cx="2999780" cy="1134357"/>
+              </a:xfrm>
+              <a:prstGeom prst="roundRect">
+                <a:avLst>
+                  <a:gd name="adj" fmla="val 5201"/>
+                </a:avLst>
+              </a:prstGeom>
+              <a:noFill/>
+              <a:ln>
+                <a:solidFill>
+                  <a:srgbClr val="333F50"/>
+                </a:solidFill>
+              </a:ln>
+            </p:spPr>
+            <p:style>
+              <a:lnRef idx="2">
+                <a:schemeClr val="accent1">
+                  <a:shade val="50000"/>
+                </a:schemeClr>
+              </a:lnRef>
+              <a:fillRef idx="1">
+                <a:schemeClr val="accent1"/>
+              </a:fillRef>
+              <a:effectRef idx="0">
+                <a:schemeClr val="accent1"/>
+              </a:effectRef>
+              <a:fontRef idx="minor">
+                <a:schemeClr val="lt1"/>
+              </a:fontRef>
+            </p:style>
+            <p:txBody>
+              <a:bodyPr rtlCol="0" anchor="ctr"/>
+              <a:lstStyle/>
+              <a:p>
+                <a:pPr algn="ctr"/>
+                <a:endParaRPr lang="en-US" dirty="0"/>
+              </a:p>
+            </p:txBody>
+          </p:sp>
+          <p:sp>
+            <p:nvSpPr>
+              <p:cNvPr id="52" name="Rectangle: Rounded Corners 51">
+                <a:hlinkClick r:id="" action="ppaction://hlinkshowjump?jump=nextslide"/>
+                <a:extLst>
+                  <a:ext uri="{FF2B5EF4-FFF2-40B4-BE49-F238E27FC236}">
+                    <a16:creationId xmlns:a16="http://schemas.microsoft.com/office/drawing/2014/main" id="{C30104BE-F607-44C0-8C1E-07B9F1F9CAEB}"/>
+                  </a:ext>
+                </a:extLst>
+              </p:cNvPr>
+              <p:cNvSpPr/>
+              <p:nvPr/>
+            </p:nvSpPr>
+            <p:spPr>
+              <a:xfrm>
+                <a:off x="4781611" y="3831716"/>
+                <a:ext cx="621578" cy="200392"/>
+              </a:xfrm>
+              <a:prstGeom prst="roundRect">
+                <a:avLst/>
+              </a:prstGeom>
+              <a:noFill/>
+              <a:ln>
+                <a:solidFill>
+                  <a:srgbClr val="FF522F"/>
+                </a:solidFill>
+              </a:ln>
+            </p:spPr>
+            <p:style>
+              <a:lnRef idx="2">
+                <a:schemeClr val="accent1">
+                  <a:shade val="50000"/>
+                </a:schemeClr>
+              </a:lnRef>
+              <a:fillRef idx="1">
+                <a:schemeClr val="accent1"/>
+              </a:fillRef>
+              <a:effectRef idx="0">
+                <a:schemeClr val="accent1"/>
+              </a:effectRef>
+              <a:fontRef idx="minor">
+                <a:schemeClr val="lt1"/>
+              </a:fontRef>
+            </p:style>
+            <p:txBody>
+              <a:bodyPr rtlCol="0" anchor="ctr"/>
+              <a:lstStyle/>
+              <a:p>
+                <a:pPr algn="ctr"/>
+                <a:r>
+                  <a:rPr lang="en-US" sz="900" dirty="0">
+                    <a:solidFill>
+                      <a:schemeClr val="tx1"/>
+                    </a:solidFill>
+                  </a:rPr>
+                  <a:t>Cancel</a:t>
+                </a:r>
+              </a:p>
+            </p:txBody>
+          </p:sp>
+        </p:grpSp>
+        <p:sp>
+          <p:nvSpPr>
+            <p:cNvPr id="146" name="Rectangle 145">
+              <a:extLst>
+                <a:ext uri="{FF2B5EF4-FFF2-40B4-BE49-F238E27FC236}">
+                  <a16:creationId xmlns:a16="http://schemas.microsoft.com/office/drawing/2014/main" id="{185386C4-8622-41BB-864B-3298A473BE0B}"/>
+                </a:ext>
+              </a:extLst>
+            </p:cNvPr>
+            <p:cNvSpPr/>
+            <p:nvPr/>
+          </p:nvSpPr>
+          <p:spPr>
+            <a:xfrm>
+              <a:off x="3212803" y="2503422"/>
+              <a:ext cx="2471738" cy="139147"/>
+            </a:xfrm>
+            <a:prstGeom prst="rect">
+              <a:avLst/>
+            </a:prstGeom>
+            <a:noFill/>
+            <a:ln>
+              <a:solidFill>
+                <a:srgbClr val="CCCCCC"/>
+              </a:solidFill>
+            </a:ln>
+          </p:spPr>
+          <p:style>
+            <a:lnRef idx="2">
+              <a:schemeClr val="accent1">
+                <a:shade val="50000"/>
+              </a:schemeClr>
+            </a:lnRef>
+            <a:fillRef idx="1">
+              <a:schemeClr val="accent1"/>
+            </a:fillRef>
+            <a:effectRef idx="0">
+              <a:schemeClr val="accent1"/>
+            </a:effectRef>
+            <a:fontRef idx="minor">
+              <a:schemeClr val="lt1"/>
+            </a:fontRef>
+          </p:style>
+          <p:txBody>
+            <a:bodyPr rtlCol="0" anchor="ctr"/>
+            <a:lstStyle/>
+            <a:p>
+              <a:r>
+                <a:rPr lang="en-US" sz="700" i="1" dirty="0">
+                  <a:solidFill>
+                    <a:schemeClr val="bg1">
+                      <a:lumMod val="50000"/>
+                    </a:schemeClr>
+                  </a:solidFill>
+                </a:rPr>
+                <a:t>&lt;enter a project number&gt; (optional)</a:t>
+              </a:r>
+            </a:p>
+          </p:txBody>
+        </p:sp>
+        <p:sp>
+          <p:nvSpPr>
+            <p:cNvPr id="147" name="TextBox 146">
+              <a:extLst>
+                <a:ext uri="{FF2B5EF4-FFF2-40B4-BE49-F238E27FC236}">
+                  <a16:creationId xmlns:a16="http://schemas.microsoft.com/office/drawing/2014/main" id="{6A56E9AB-E807-4BEB-B579-9101B3A4B253}"/>
+                </a:ext>
+              </a:extLst>
+            </p:cNvPr>
+            <p:cNvSpPr txBox="1"/>
+            <p:nvPr/>
+          </p:nvSpPr>
+          <p:spPr>
+            <a:xfrm>
+              <a:off x="3106243" y="2334338"/>
+              <a:ext cx="1322784" cy="200055"/>
+            </a:xfrm>
+            <a:prstGeom prst="rect">
+              <a:avLst/>
+            </a:prstGeom>
+            <a:noFill/>
+          </p:spPr>
+          <p:txBody>
+            <a:bodyPr wrap="square" rtlCol="0">
+              <a:spAutoFit/>
+            </a:bodyPr>
+            <a:lstStyle/>
+            <a:p>
+              <a:r>
+                <a:rPr lang="en-US" sz="700" dirty="0">
+                  <a:latin typeface="Arial" panose="020B0604020202020204" pitchFamily="34" charset="0"/>
+                  <a:cs typeface="Arial" panose="020B0604020202020204" pitchFamily="34" charset="0"/>
+                </a:rPr>
+                <a:t>External Project ID</a:t>
+              </a:r>
+            </a:p>
+          </p:txBody>
+        </p:sp>
+      </p:grpSp>
+      <p:sp>
+        <p:nvSpPr>
+          <p:cNvPr id="3" name="TextBox 2">
+            <a:extLst>
+              <a:ext uri="{FF2B5EF4-FFF2-40B4-BE49-F238E27FC236}">
+                <a16:creationId xmlns:a16="http://schemas.microsoft.com/office/drawing/2014/main" id="{6777ECB6-E9E1-E16F-453F-49F46B0B261B}"/>
+              </a:ext>
+            </a:extLst>
+          </p:cNvPr>
+          <p:cNvSpPr txBox="1"/>
+          <p:nvPr/>
+        </p:nvSpPr>
+        <p:spPr>
+          <a:xfrm>
+            <a:off x="2881563" y="4036984"/>
+            <a:ext cx="5997742" cy="2462213"/>
+          </a:xfrm>
+          <a:prstGeom prst="rect">
+            <a:avLst/>
+          </a:prstGeom>
+          <a:noFill/>
+        </p:spPr>
+        <p:txBody>
+          <a:bodyPr wrap="square" rtlCol="0">
+            <a:spAutoFit/>
+          </a:bodyPr>
+          <a:lstStyle/>
+          <a:p>
+            <a:r>
+              <a:rPr lang="en-US" sz="1400" dirty="0"/>
+              <a:t>Changes; </a:t>
+            </a:r>
+          </a:p>
+          <a:p>
+            <a:pPr marL="342900" indent="-342900">
+              <a:buFontTx/>
+              <a:buAutoNum type="arabicPeriod"/>
+            </a:pPr>
+            <a:r>
+              <a:rPr lang="en-US" sz="1400" dirty="0"/>
+              <a:t>Move “Log Path” to a text file that lives with the installer on a user's machine.  This is something that wants to be consistent across a company. (Remove from UI) – Change the name of the path to </a:t>
+            </a:r>
+            <a:r>
+              <a:rPr lang="en-US" sz="1400" u="sng" dirty="0">
+                <a:solidFill>
+                  <a:srgbClr val="FF0000"/>
+                </a:solidFill>
+              </a:rPr>
+              <a:t>“Project Root”</a:t>
+            </a:r>
+          </a:p>
+          <a:p>
+            <a:pPr marL="342900" indent="-342900">
+              <a:buAutoNum type="arabicPeriod"/>
+            </a:pPr>
+            <a:r>
+              <a:rPr lang="en-US" sz="1400" dirty="0"/>
+              <a:t>Move Project Name/ Project Number/ and External Project ID to Extensible Storage values (if they are not already) </a:t>
+            </a:r>
+          </a:p>
+          <a:p>
+            <a:pPr marL="342900" indent="-342900">
+              <a:buAutoNum type="arabicPeriod"/>
+            </a:pPr>
+            <a:r>
+              <a:rPr lang="en-US" sz="1400" dirty="0"/>
+              <a:t>Add  “Model Name” and “Model Discipline” to the “Details” section and make Extensible Storage</a:t>
+            </a:r>
+          </a:p>
+          <a:p>
+            <a:pPr marL="342900" indent="-342900">
+              <a:buAutoNum type="arabicPeriod"/>
+            </a:pPr>
+            <a:r>
+              <a:rPr lang="en-US" sz="1400" dirty="0"/>
+              <a:t>Remove the “Scope” section from the UI and Merge Features into “Log Filter Settings” – See Next Page</a:t>
+            </a:r>
+          </a:p>
+          <a:p>
+            <a:pPr marL="342900" indent="-342900">
+              <a:buAutoNum type="arabicPeriod"/>
+            </a:pPr>
+            <a:endParaRPr lang="en-US" sz="1400" dirty="0"/>
+          </a:p>
+        </p:txBody>
+      </p:sp>
+      <p:sp>
+        <p:nvSpPr>
+          <p:cNvPr id="5" name="Rectangle: Rounded Corners 4">
+            <a:extLst>
+              <a:ext uri="{FF2B5EF4-FFF2-40B4-BE49-F238E27FC236}">
+                <a16:creationId xmlns:a16="http://schemas.microsoft.com/office/drawing/2014/main" id="{89C155C1-5F40-BE34-4E1D-48E7C1FB7409}"/>
+              </a:ext>
+            </a:extLst>
+          </p:cNvPr>
+          <p:cNvSpPr/>
+          <p:nvPr/>
+        </p:nvSpPr>
+        <p:spPr>
+          <a:xfrm>
+            <a:off x="2604837" y="769520"/>
+            <a:ext cx="3122986" cy="290592"/>
+          </a:xfrm>
+          <a:prstGeom prst="roundRect">
+            <a:avLst/>
+          </a:prstGeom>
+          <a:solidFill>
+            <a:srgbClr val="BFBFBF">
+              <a:alpha val="50196"/>
+            </a:srgbClr>
+          </a:solidFill>
+          <a:ln>
+            <a:noFill/>
+          </a:ln>
+        </p:spPr>
+        <p:style>
+          <a:lnRef idx="2">
+            <a:schemeClr val="accent1">
+              <a:shade val="50000"/>
+            </a:schemeClr>
+          </a:lnRef>
+          <a:fillRef idx="1">
+            <a:schemeClr val="accent1"/>
+          </a:fillRef>
+          <a:effectRef idx="0">
+            <a:schemeClr val="accent1"/>
+          </a:effectRef>
+          <a:fontRef idx="minor">
+            <a:schemeClr val="lt1"/>
+          </a:fontRef>
+        </p:style>
+        <p:txBody>
+          <a:bodyPr rtlCol="0" anchor="ctr"/>
+          <a:lstStyle/>
+          <a:p>
+            <a:r>
+              <a:rPr lang="en-US" dirty="0">
+                <a:solidFill>
+                  <a:schemeClr val="tx1"/>
+                </a:solidFill>
+              </a:rPr>
+              <a:t>#1</a:t>
+            </a:r>
+          </a:p>
+        </p:txBody>
+      </p:sp>
+      <p:sp>
+        <p:nvSpPr>
+          <p:cNvPr id="81" name="Rectangle: Rounded Corners 80">
+            <a:extLst>
+              <a:ext uri="{FF2B5EF4-FFF2-40B4-BE49-F238E27FC236}">
+                <a16:creationId xmlns:a16="http://schemas.microsoft.com/office/drawing/2014/main" id="{D63A10B8-5F64-2FD5-2C82-F48FD7895F82}"/>
+              </a:ext>
+            </a:extLst>
+          </p:cNvPr>
+          <p:cNvSpPr/>
+          <p:nvPr/>
+        </p:nvSpPr>
+        <p:spPr>
+          <a:xfrm>
+            <a:off x="2604837" y="2557880"/>
+            <a:ext cx="3122986" cy="290592"/>
+          </a:xfrm>
+          <a:prstGeom prst="roundRect">
+            <a:avLst/>
+          </a:prstGeom>
+          <a:solidFill>
+            <a:srgbClr val="BFBFBF">
+              <a:alpha val="50196"/>
+            </a:srgbClr>
+          </a:solidFill>
+          <a:ln>
+            <a:noFill/>
+          </a:ln>
+        </p:spPr>
+        <p:style>
+          <a:lnRef idx="2">
+            <a:schemeClr val="accent1">
+              <a:shade val="50000"/>
+            </a:schemeClr>
+          </a:lnRef>
+          <a:fillRef idx="1">
+            <a:schemeClr val="accent1"/>
+          </a:fillRef>
+          <a:effectRef idx="0">
+            <a:schemeClr val="accent1"/>
+          </a:effectRef>
+          <a:fontRef idx="minor">
+            <a:schemeClr val="lt1"/>
+          </a:fontRef>
+        </p:style>
+        <p:txBody>
+          <a:bodyPr rtlCol="0" anchor="ctr"/>
+          <a:lstStyle/>
+          <a:p>
+            <a:r>
+              <a:rPr lang="en-US" dirty="0">
+                <a:solidFill>
+                  <a:schemeClr val="tx1"/>
+                </a:solidFill>
+              </a:rPr>
+              <a:t>#4</a:t>
+            </a:r>
+          </a:p>
+        </p:txBody>
+      </p:sp>
+      <p:sp>
+        <p:nvSpPr>
+          <p:cNvPr id="82" name="Rectangle: Rounded Corners 81">
+            <a:extLst>
+              <a:ext uri="{FF2B5EF4-FFF2-40B4-BE49-F238E27FC236}">
+                <a16:creationId xmlns:a16="http://schemas.microsoft.com/office/drawing/2014/main" id="{A932AE2E-6B3E-0426-C802-B5A8F739714B}"/>
+              </a:ext>
+            </a:extLst>
+          </p:cNvPr>
+          <p:cNvSpPr/>
+          <p:nvPr/>
+        </p:nvSpPr>
+        <p:spPr>
+          <a:xfrm>
+            <a:off x="2604837" y="1126318"/>
+            <a:ext cx="3122986" cy="895828"/>
+          </a:xfrm>
+          <a:prstGeom prst="roundRect">
+            <a:avLst/>
+          </a:prstGeom>
+          <a:solidFill>
+            <a:srgbClr val="BFBFBF">
+              <a:alpha val="50196"/>
+            </a:srgbClr>
+          </a:solidFill>
+          <a:ln>
+            <a:noFill/>
+          </a:ln>
+        </p:spPr>
+        <p:style>
+          <a:lnRef idx="2">
+            <a:schemeClr val="accent1">
+              <a:shade val="50000"/>
+            </a:schemeClr>
+          </a:lnRef>
+          <a:fillRef idx="1">
+            <a:schemeClr val="accent1"/>
+          </a:fillRef>
+          <a:effectRef idx="0">
+            <a:schemeClr val="accent1"/>
+          </a:effectRef>
+          <a:fontRef idx="minor">
+            <a:schemeClr val="lt1"/>
+          </a:fontRef>
+        </p:style>
+        <p:txBody>
+          <a:bodyPr rtlCol="0" anchor="ctr"/>
+          <a:lstStyle/>
+          <a:p>
+            <a:r>
+              <a:rPr lang="en-US" dirty="0">
+                <a:solidFill>
+                  <a:schemeClr val="tx1"/>
+                </a:solidFill>
+              </a:rPr>
+              <a:t>#2</a:t>
+            </a:r>
+          </a:p>
+        </p:txBody>
+      </p:sp>
+      <p:sp>
+        <p:nvSpPr>
+          <p:cNvPr id="83" name="Rectangle: Rounded Corners 82">
+            <a:extLst>
+              <a:ext uri="{FF2B5EF4-FFF2-40B4-BE49-F238E27FC236}">
+                <a16:creationId xmlns:a16="http://schemas.microsoft.com/office/drawing/2014/main" id="{369B6F59-ABED-664A-054D-D7BAF84EDE6C}"/>
+              </a:ext>
+            </a:extLst>
+          </p:cNvPr>
+          <p:cNvSpPr/>
+          <p:nvPr/>
+        </p:nvSpPr>
+        <p:spPr>
+          <a:xfrm>
+            <a:off x="2604837" y="2169933"/>
+            <a:ext cx="3122986" cy="290592"/>
+          </a:xfrm>
+          <a:prstGeom prst="roundRect">
+            <a:avLst/>
+          </a:prstGeom>
+          <a:solidFill>
+            <a:srgbClr val="BFBFBF">
+              <a:alpha val="50196"/>
+            </a:srgbClr>
+          </a:solidFill>
+          <a:ln>
+            <a:noFill/>
+          </a:ln>
+        </p:spPr>
+        <p:style>
+          <a:lnRef idx="2">
+            <a:schemeClr val="accent1">
+              <a:shade val="50000"/>
+            </a:schemeClr>
+          </a:lnRef>
+          <a:fillRef idx="1">
+            <a:schemeClr val="accent1"/>
+          </a:fillRef>
+          <a:effectRef idx="0">
+            <a:schemeClr val="accent1"/>
+          </a:effectRef>
+          <a:fontRef idx="minor">
+            <a:schemeClr val="lt1"/>
+          </a:fontRef>
+        </p:style>
+        <p:txBody>
+          <a:bodyPr rtlCol="0" anchor="ctr"/>
+          <a:lstStyle/>
+          <a:p>
+            <a:r>
+              <a:rPr lang="en-US" dirty="0">
+                <a:solidFill>
+                  <a:schemeClr val="tx1"/>
+                </a:solidFill>
+              </a:rPr>
+              <a:t>#3</a:t>
+            </a:r>
+          </a:p>
+        </p:txBody>
+      </p:sp>
+      <p:sp>
+        <p:nvSpPr>
+          <p:cNvPr id="8" name="Arrow: Right 7">
+            <a:extLst>
+              <a:ext uri="{FF2B5EF4-FFF2-40B4-BE49-F238E27FC236}">
+                <a16:creationId xmlns:a16="http://schemas.microsoft.com/office/drawing/2014/main" id="{84BDB061-938A-E620-9F44-7AD36DB6D4EB}"/>
+              </a:ext>
+            </a:extLst>
+          </p:cNvPr>
+          <p:cNvSpPr/>
+          <p:nvPr/>
+        </p:nvSpPr>
+        <p:spPr>
+          <a:xfrm flipH="1">
+            <a:off x="7757970" y="-18520"/>
+            <a:ext cx="1953648" cy="1089051"/>
+          </a:xfrm>
+          <a:prstGeom prst="rightArrow">
+            <a:avLst/>
+          </a:prstGeom>
+          <a:solidFill>
+            <a:srgbClr val="FF0000"/>
+          </a:solidFill>
+          <a:ln>
+            <a:noFill/>
+          </a:ln>
+        </p:spPr>
+        <p:style>
+          <a:lnRef idx="2">
+            <a:schemeClr val="accent1">
+              <a:shade val="50000"/>
+            </a:schemeClr>
+          </a:lnRef>
+          <a:fillRef idx="1">
+            <a:schemeClr val="accent1"/>
+          </a:fillRef>
+          <a:effectRef idx="0">
+            <a:schemeClr val="accent1"/>
+          </a:effectRef>
+          <a:fontRef idx="minor">
+            <a:schemeClr val="lt1"/>
+          </a:fontRef>
+        </p:style>
+        <p:txBody>
+          <a:bodyPr rtlCol="0" anchor="ctr"/>
+          <a:lstStyle/>
+          <a:p>
+            <a:pPr algn="ctr"/>
+            <a:r>
+              <a:rPr lang="en-US" sz="1200" dirty="0"/>
+              <a:t>5. Fix as it still references JSON Files</a:t>
+            </a:r>
+          </a:p>
+        </p:txBody>
+      </p:sp>
+    </p:spTree>
+    <p:extLst>
+      <p:ext uri="{BB962C8B-B14F-4D97-AF65-F5344CB8AC3E}">
+        <p14:creationId xmlns:p14="http://schemas.microsoft.com/office/powerpoint/2010/main" val="2213948484"/>
+      </p:ext>
+    </p:extLst>
+  </p:cSld>
+  <p:clrMapOvr>
+    <a:masterClrMapping/>
+  </p:clrMapOvr>
+</p:sld>
+</file>
+
 <file path=ppt/theme/theme1.xml><?xml version="1.0" encoding="utf-8"?>
 <a:theme xmlns:a="http://schemas.openxmlformats.org/drawingml/2006/main" name="Office Theme">
   <a:themeElements>

</xml_diff>